<commit_message>
Worked on the final Abgabe
</commit_message>
<xml_diff>
--- a/Finale_Abgabe/Schiffe_versenken.pptx
+++ b/Finale_Abgabe/Schiffe_versenken.pptx
@@ -3968,7 +3968,7 @@
             </a:br>
             <a:r>
               <a:rPr lang="de-AT" dirty="0"/>
-              <a:t>Erreicht -&gt; 33 + 76 + 0 + </a:t>
+              <a:t>Erreicht -&gt; 28 + 76 + 0 </a:t>
             </a:r>
           </a:p>
           <a:p>
@@ -4173,21 +4173,6 @@
           <a:p>
             <a:endParaRPr lang="de-AT" dirty="0"/>
           </a:p>
-          <a:p>
-            <a:r>
-              <a:rPr lang="de-AT" sz="2800" spc="-50" dirty="0">
-                <a:latin typeface="+mj-lt"/>
-                <a:ea typeface="+mj-ea"/>
-                <a:cs typeface="+mj-cs"/>
-              </a:rPr>
-              <a:t>Spiel</a:t>
-            </a:r>
-            <a:endParaRPr lang="en-AT" sz="2800" spc="-50" dirty="0">
-              <a:latin typeface="+mj-lt"/>
-              <a:ea typeface="+mj-ea"/>
-              <a:cs typeface="+mj-cs"/>
-            </a:endParaRPr>
-          </a:p>
         </p:txBody>
       </p:sp>
       <p:cxnSp>
@@ -4476,7 +4461,7 @@
             </a:pPr>
             <a:r>
               <a:rPr lang="de-AT" dirty="0"/>
-              <a:t> beste Team</a:t>
+              <a:t> bestes Team</a:t>
             </a:r>
           </a:p>
           <a:p>
@@ -5828,8 +5813,38 @@
         </p:blipFill>
         <p:spPr>
           <a:xfrm>
-            <a:off x="6517333" y="2353395"/>
-            <a:ext cx="4310513" cy="1999915"/>
+            <a:off x="5835831" y="2089023"/>
+            <a:ext cx="5095225" cy="2363992"/>
+          </a:xfrm>
+          <a:prstGeom prst="rect">
+            <a:avLst/>
+          </a:prstGeom>
+        </p:spPr>
+      </p:pic>
+      <p:pic>
+        <p:nvPicPr>
+          <p:cNvPr id="4" name="Picture 3" descr="Graphical user interface, chart, line chart&#10;&#10;Description automatically generated">
+            <a:extLst>
+              <a:ext uri="{FF2B5EF4-FFF2-40B4-BE49-F238E27FC236}">
+                <a16:creationId xmlns:a16="http://schemas.microsoft.com/office/drawing/2014/main" id="{F7C4FA9D-DBFC-42B0-B131-51F946F27A75}"/>
+              </a:ext>
+            </a:extLst>
+          </p:cNvPr>
+          <p:cNvPicPr>
+            <a:picLocks noChangeAspect="1"/>
+          </p:cNvPicPr>
+          <p:nvPr/>
+        </p:nvPicPr>
+        <p:blipFill>
+          <a:blip r:embed="rId5"/>
+          <a:stretch>
+            <a:fillRect/>
+          </a:stretch>
+        </p:blipFill>
+        <p:spPr>
+          <a:xfrm>
+            <a:off x="5872464" y="4607236"/>
+            <a:ext cx="5021957" cy="1788338"/>
           </a:xfrm>
           <a:prstGeom prst="rect">
             <a:avLst/>
@@ -5978,31 +5993,6 @@
           </a:fontRef>
         </p:style>
       </p:cxnSp>
-      <p:sp>
-        <p:nvSpPr>
-          <p:cNvPr id="4" name="Content Placeholder 3">
-            <a:extLst>
-              <a:ext uri="{FF2B5EF4-FFF2-40B4-BE49-F238E27FC236}">
-                <a16:creationId xmlns:a16="http://schemas.microsoft.com/office/drawing/2014/main" id="{2C2817D0-C3A7-418B-821E-A07C9DA6AC91}"/>
-              </a:ext>
-            </a:extLst>
-          </p:cNvPr>
-          <p:cNvSpPr>
-            <a:spLocks noGrp="1"/>
-          </p:cNvSpPr>
-          <p:nvPr>
-            <p:ph idx="1"/>
-          </p:nvPr>
-        </p:nvSpPr>
-        <p:spPr/>
-        <p:txBody>
-          <a:bodyPr/>
-          <a:lstStyle/>
-          <a:p>
-            <a:endParaRPr lang="en-AT"/>
-          </a:p>
-        </p:txBody>
-      </p:sp>
     </p:spTree>
     <p:extLst>
       <p:ext uri="{BB962C8B-B14F-4D97-AF65-F5344CB8AC3E}">
@@ -6145,28 +6135,511 @@
           </a:fontRef>
         </p:style>
       </p:cxnSp>
-      <p:sp>
-        <p:nvSpPr>
-          <p:cNvPr id="4" name="Content Placeholder 3">
-            <a:extLst>
-              <a:ext uri="{FF2B5EF4-FFF2-40B4-BE49-F238E27FC236}">
-                <a16:creationId xmlns:a16="http://schemas.microsoft.com/office/drawing/2014/main" id="{2C2817D0-C3A7-418B-821E-A07C9DA6AC91}"/>
-              </a:ext>
-            </a:extLst>
-          </p:cNvPr>
-          <p:cNvSpPr>
-            <a:spLocks noGrp="1"/>
-          </p:cNvSpPr>
-          <p:nvPr>
-            <p:ph idx="1"/>
-          </p:nvPr>
-        </p:nvSpPr>
-        <p:spPr/>
-        <p:txBody>
-          <a:bodyPr/>
+      <p:pic>
+        <p:nvPicPr>
+          <p:cNvPr id="5" name="Picture 4" descr="Graphical user interface, text, application, email&#10;&#10;Description automatically generated">
+            <a:extLst>
+              <a:ext uri="{FF2B5EF4-FFF2-40B4-BE49-F238E27FC236}">
+                <a16:creationId xmlns:a16="http://schemas.microsoft.com/office/drawing/2014/main" id="{BB0E1E00-35CC-45A4-AFC9-0C5CC23A1A9A}"/>
+              </a:ext>
+            </a:extLst>
+          </p:cNvPr>
+          <p:cNvPicPr>
+            <a:picLocks noChangeAspect="1"/>
+          </p:cNvPicPr>
+          <p:nvPr/>
+        </p:nvPicPr>
+        <p:blipFill rotWithShape="1">
+          <a:blip r:embed="rId2"/>
+          <a:srcRect r="32132" b="12277"/>
+          <a:stretch/>
+        </p:blipFill>
+        <p:spPr>
+          <a:xfrm>
+            <a:off x="7896745" y="786383"/>
+            <a:ext cx="3975470" cy="2496620"/>
+          </a:xfrm>
+          <a:prstGeom prst="rect">
+            <a:avLst/>
+          </a:prstGeom>
+          <a:ln w="12700">
+            <a:solidFill>
+              <a:schemeClr val="accent1"/>
+            </a:solidFill>
+          </a:ln>
+        </p:spPr>
+      </p:pic>
+      <p:pic>
+        <p:nvPicPr>
+          <p:cNvPr id="7" name="Picture 6" descr="Calendar&#10;&#10;Description automatically generated">
+            <a:extLst>
+              <a:ext uri="{FF2B5EF4-FFF2-40B4-BE49-F238E27FC236}">
+                <a16:creationId xmlns:a16="http://schemas.microsoft.com/office/drawing/2014/main" id="{64E3AD6F-3053-4881-98C6-8D61656B0746}"/>
+              </a:ext>
+            </a:extLst>
+          </p:cNvPr>
+          <p:cNvPicPr>
+            <a:picLocks noChangeAspect="1"/>
+          </p:cNvPicPr>
+          <p:nvPr/>
+        </p:nvPicPr>
+        <p:blipFill>
+          <a:blip r:embed="rId3"/>
+          <a:stretch>
+            <a:fillRect/>
+          </a:stretch>
+        </p:blipFill>
+        <p:spPr>
+          <a:xfrm>
+            <a:off x="5064090" y="1693916"/>
+            <a:ext cx="2751585" cy="2372883"/>
+          </a:xfrm>
+          <a:prstGeom prst="rect">
+            <a:avLst/>
+          </a:prstGeom>
+          <a:ln w="12700">
+            <a:solidFill>
+              <a:schemeClr val="accent1"/>
+            </a:solidFill>
+          </a:ln>
+        </p:spPr>
+      </p:pic>
+      <p:pic>
+        <p:nvPicPr>
+          <p:cNvPr id="10" name="Picture 9" descr="Calendar&#10;&#10;Description automatically generated">
+            <a:extLst>
+              <a:ext uri="{FF2B5EF4-FFF2-40B4-BE49-F238E27FC236}">
+                <a16:creationId xmlns:a16="http://schemas.microsoft.com/office/drawing/2014/main" id="{F609FF0E-52C5-44A3-950F-A75A59681238}"/>
+              </a:ext>
+            </a:extLst>
+          </p:cNvPr>
+          <p:cNvPicPr>
+            <a:picLocks noChangeAspect="1"/>
+          </p:cNvPicPr>
+          <p:nvPr/>
+        </p:nvPicPr>
+        <p:blipFill>
+          <a:blip r:embed="rId4"/>
+          <a:stretch>
+            <a:fillRect/>
+          </a:stretch>
+        </p:blipFill>
+        <p:spPr>
+          <a:xfrm>
+            <a:off x="5074292" y="4194052"/>
+            <a:ext cx="2741383" cy="2608811"/>
+          </a:xfrm>
+          <a:prstGeom prst="rect">
+            <a:avLst/>
+          </a:prstGeom>
+          <a:ln w="12700">
+            <a:solidFill>
+              <a:schemeClr val="accent1"/>
+            </a:solidFill>
+          </a:ln>
+        </p:spPr>
+      </p:pic>
+      <p:pic>
+        <p:nvPicPr>
+          <p:cNvPr id="13" name="Picture 12" descr="Graphical user interface, text, application&#10;&#10;Description automatically generated">
+            <a:extLst>
+              <a:ext uri="{FF2B5EF4-FFF2-40B4-BE49-F238E27FC236}">
+                <a16:creationId xmlns:a16="http://schemas.microsoft.com/office/drawing/2014/main" id="{29C1AFEE-F3EE-4AA0-9788-8EF2190AACA8}"/>
+              </a:ext>
+            </a:extLst>
+          </p:cNvPr>
+          <p:cNvPicPr>
+            <a:picLocks noChangeAspect="1"/>
+          </p:cNvPicPr>
+          <p:nvPr/>
+        </p:nvPicPr>
+        <p:blipFill>
+          <a:blip r:embed="rId5"/>
+          <a:stretch>
+            <a:fillRect/>
+          </a:stretch>
+        </p:blipFill>
+        <p:spPr>
+          <a:xfrm>
+            <a:off x="5074293" y="385999"/>
+            <a:ext cx="2741383" cy="1103674"/>
+          </a:xfrm>
+          <a:prstGeom prst="rect">
+            <a:avLst/>
+          </a:prstGeom>
+          <a:ln w="12700">
+            <a:solidFill>
+              <a:schemeClr val="accent1"/>
+            </a:solidFill>
+          </a:ln>
+        </p:spPr>
+      </p:pic>
+      <p:pic>
+        <p:nvPicPr>
+          <p:cNvPr id="15" name="Picture 14" descr="Text&#10;&#10;Description automatically generated">
+            <a:extLst>
+              <a:ext uri="{FF2B5EF4-FFF2-40B4-BE49-F238E27FC236}">
+                <a16:creationId xmlns:a16="http://schemas.microsoft.com/office/drawing/2014/main" id="{010EF34B-C840-4A55-AB23-84BF0FD1CD03}"/>
+              </a:ext>
+            </a:extLst>
+          </p:cNvPr>
+          <p:cNvPicPr>
+            <a:picLocks noChangeAspect="1"/>
+          </p:cNvPicPr>
+          <p:nvPr/>
+        </p:nvPicPr>
+        <p:blipFill>
+          <a:blip r:embed="rId6"/>
+          <a:stretch>
+            <a:fillRect/>
+          </a:stretch>
+        </p:blipFill>
+        <p:spPr>
+          <a:xfrm>
+            <a:off x="7893479" y="3712482"/>
+            <a:ext cx="3978736" cy="2124568"/>
+          </a:xfrm>
+          <a:prstGeom prst="rect">
+            <a:avLst/>
+          </a:prstGeom>
+          <a:ln w="12700">
+            <a:solidFill>
+              <a:schemeClr val="accent1"/>
+            </a:solidFill>
+          </a:ln>
+        </p:spPr>
+      </p:pic>
+      <p:pic>
+        <p:nvPicPr>
+          <p:cNvPr id="17" name="Picture 16" descr="Text&#10;&#10;Description automatically generated">
+            <a:extLst>
+              <a:ext uri="{FF2B5EF4-FFF2-40B4-BE49-F238E27FC236}">
+                <a16:creationId xmlns:a16="http://schemas.microsoft.com/office/drawing/2014/main" id="{ED4665F4-6B46-4CB4-A566-6B47C444BF0E}"/>
+              </a:ext>
+            </a:extLst>
+          </p:cNvPr>
+          <p:cNvPicPr>
+            <a:picLocks noChangeAspect="1"/>
+          </p:cNvPicPr>
+          <p:nvPr/>
+        </p:nvPicPr>
+        <p:blipFill rotWithShape="1">
+          <a:blip r:embed="rId7"/>
+          <a:srcRect b="90022"/>
+          <a:stretch/>
+        </p:blipFill>
+        <p:spPr>
+          <a:xfrm>
+            <a:off x="7896745" y="6334968"/>
+            <a:ext cx="3975470" cy="274065"/>
+          </a:xfrm>
+          <a:prstGeom prst="rect">
+            <a:avLst/>
+          </a:prstGeom>
+          <a:ln w="12700">
+            <a:solidFill>
+              <a:schemeClr val="accent1"/>
+            </a:solidFill>
+          </a:ln>
+        </p:spPr>
+      </p:pic>
+      <p:sp>
+        <p:nvSpPr>
+          <p:cNvPr id="18" name="TextBox 17">
+            <a:extLst>
+              <a:ext uri="{FF2B5EF4-FFF2-40B4-BE49-F238E27FC236}">
+                <a16:creationId xmlns:a16="http://schemas.microsoft.com/office/drawing/2014/main" id="{B12AB11F-F442-4016-9231-691DAA966097}"/>
+              </a:ext>
+            </a:extLst>
+          </p:cNvPr>
+          <p:cNvSpPr txBox="1"/>
+          <p:nvPr/>
+        </p:nvSpPr>
+        <p:spPr>
+          <a:xfrm>
+            <a:off x="7541703" y="385999"/>
+            <a:ext cx="273972" cy="307777"/>
+          </a:xfrm>
+          <a:prstGeom prst="rect">
+            <a:avLst/>
+          </a:prstGeom>
+          <a:noFill/>
+          <a:ln>
+            <a:solidFill>
+              <a:schemeClr val="accent1"/>
+            </a:solidFill>
+          </a:ln>
+        </p:spPr>
+        <p:txBody>
+          <a:bodyPr wrap="square" rtlCol="0">
+            <a:spAutoFit/>
+          </a:bodyPr>
           <a:lstStyle/>
           <a:p>
-            <a:endParaRPr lang="en-AT"/>
+            <a:r>
+              <a:rPr lang="de-AT" sz="1400" b="1" dirty="0">
+                <a:solidFill>
+                  <a:schemeClr val="accent1"/>
+                </a:solidFill>
+              </a:rPr>
+              <a:t>1</a:t>
+            </a:r>
+            <a:endParaRPr lang="en-AT" b="1" dirty="0">
+              <a:solidFill>
+                <a:schemeClr val="accent1"/>
+              </a:solidFill>
+            </a:endParaRPr>
+          </a:p>
+        </p:txBody>
+      </p:sp>
+      <p:sp>
+        <p:nvSpPr>
+          <p:cNvPr id="19" name="TextBox 18">
+            <a:extLst>
+              <a:ext uri="{FF2B5EF4-FFF2-40B4-BE49-F238E27FC236}">
+                <a16:creationId xmlns:a16="http://schemas.microsoft.com/office/drawing/2014/main" id="{092020E5-9165-4B77-9829-921351226535}"/>
+              </a:ext>
+            </a:extLst>
+          </p:cNvPr>
+          <p:cNvSpPr txBox="1"/>
+          <p:nvPr/>
+        </p:nvSpPr>
+        <p:spPr>
+          <a:xfrm>
+            <a:off x="11598243" y="786383"/>
+            <a:ext cx="273972" cy="307777"/>
+          </a:xfrm>
+          <a:prstGeom prst="rect">
+            <a:avLst/>
+          </a:prstGeom>
+          <a:noFill/>
+          <a:ln>
+            <a:solidFill>
+              <a:schemeClr val="accent1"/>
+            </a:solidFill>
+          </a:ln>
+        </p:spPr>
+        <p:txBody>
+          <a:bodyPr wrap="square" rtlCol="0">
+            <a:spAutoFit/>
+          </a:bodyPr>
+          <a:lstStyle/>
+          <a:p>
+            <a:r>
+              <a:rPr lang="de-AT" sz="1400" b="1" dirty="0">
+                <a:solidFill>
+                  <a:schemeClr val="accent1"/>
+                </a:solidFill>
+              </a:rPr>
+              <a:t>2</a:t>
+            </a:r>
+            <a:endParaRPr lang="en-AT" sz="1400" b="1" dirty="0">
+              <a:solidFill>
+                <a:schemeClr val="accent1"/>
+              </a:solidFill>
+            </a:endParaRPr>
+          </a:p>
+        </p:txBody>
+      </p:sp>
+      <p:sp>
+        <p:nvSpPr>
+          <p:cNvPr id="21" name="TextBox 20">
+            <a:extLst>
+              <a:ext uri="{FF2B5EF4-FFF2-40B4-BE49-F238E27FC236}">
+                <a16:creationId xmlns:a16="http://schemas.microsoft.com/office/drawing/2014/main" id="{DA0010FB-FA7C-494C-A4AC-416714C7FB5B}"/>
+              </a:ext>
+            </a:extLst>
+          </p:cNvPr>
+          <p:cNvSpPr txBox="1"/>
+          <p:nvPr/>
+        </p:nvSpPr>
+        <p:spPr>
+          <a:xfrm>
+            <a:off x="6302896" y="1693916"/>
+            <a:ext cx="273972" cy="307777"/>
+          </a:xfrm>
+          <a:prstGeom prst="rect">
+            <a:avLst/>
+          </a:prstGeom>
+          <a:solidFill>
+            <a:schemeClr val="bg1"/>
+          </a:solidFill>
+          <a:ln>
+            <a:solidFill>
+              <a:schemeClr val="accent1"/>
+            </a:solidFill>
+          </a:ln>
+        </p:spPr>
+        <p:txBody>
+          <a:bodyPr wrap="square" rtlCol="0">
+            <a:spAutoFit/>
+          </a:bodyPr>
+          <a:lstStyle/>
+          <a:p>
+            <a:r>
+              <a:rPr lang="de-AT" sz="1400" b="1" dirty="0">
+                <a:solidFill>
+                  <a:schemeClr val="accent1"/>
+                </a:solidFill>
+              </a:rPr>
+              <a:t>3</a:t>
+            </a:r>
+            <a:endParaRPr lang="en-AT" b="1" dirty="0">
+              <a:solidFill>
+                <a:schemeClr val="accent1"/>
+              </a:solidFill>
+            </a:endParaRPr>
+          </a:p>
+        </p:txBody>
+      </p:sp>
+      <p:sp>
+        <p:nvSpPr>
+          <p:cNvPr id="22" name="TextBox 21">
+            <a:extLst>
+              <a:ext uri="{FF2B5EF4-FFF2-40B4-BE49-F238E27FC236}">
+                <a16:creationId xmlns:a16="http://schemas.microsoft.com/office/drawing/2014/main" id="{E1DBD8F7-D88F-4F88-BE41-2F5BE45B4040}"/>
+              </a:ext>
+            </a:extLst>
+          </p:cNvPr>
+          <p:cNvSpPr txBox="1"/>
+          <p:nvPr/>
+        </p:nvSpPr>
+        <p:spPr>
+          <a:xfrm>
+            <a:off x="11598243" y="3704792"/>
+            <a:ext cx="273972" cy="276999"/>
+          </a:xfrm>
+          <a:prstGeom prst="rect">
+            <a:avLst/>
+          </a:prstGeom>
+          <a:solidFill>
+            <a:schemeClr val="bg1"/>
+          </a:solidFill>
+          <a:ln>
+            <a:solidFill>
+              <a:schemeClr val="accent1"/>
+            </a:solidFill>
+          </a:ln>
+        </p:spPr>
+        <p:txBody>
+          <a:bodyPr wrap="square" rtlCol="0">
+            <a:spAutoFit/>
+          </a:bodyPr>
+          <a:lstStyle/>
+          <a:p>
+            <a:r>
+              <a:rPr lang="de-AT" sz="1200" b="1" dirty="0">
+                <a:solidFill>
+                  <a:schemeClr val="accent1"/>
+                </a:solidFill>
+              </a:rPr>
+              <a:t>4</a:t>
+            </a:r>
+            <a:endParaRPr lang="en-AT" sz="1600" b="1" dirty="0">
+              <a:solidFill>
+                <a:schemeClr val="accent1"/>
+              </a:solidFill>
+            </a:endParaRPr>
+          </a:p>
+        </p:txBody>
+      </p:sp>
+      <p:sp>
+        <p:nvSpPr>
+          <p:cNvPr id="23" name="TextBox 22">
+            <a:extLst>
+              <a:ext uri="{FF2B5EF4-FFF2-40B4-BE49-F238E27FC236}">
+                <a16:creationId xmlns:a16="http://schemas.microsoft.com/office/drawing/2014/main" id="{6454E249-D00B-4B21-9FBA-80947471C647}"/>
+              </a:ext>
+            </a:extLst>
+          </p:cNvPr>
+          <p:cNvSpPr txBox="1"/>
+          <p:nvPr/>
+        </p:nvSpPr>
+        <p:spPr>
+          <a:xfrm>
+            <a:off x="6302896" y="4186362"/>
+            <a:ext cx="273972" cy="307777"/>
+          </a:xfrm>
+          <a:prstGeom prst="rect">
+            <a:avLst/>
+          </a:prstGeom>
+          <a:solidFill>
+            <a:schemeClr val="bg1"/>
+          </a:solidFill>
+          <a:ln>
+            <a:solidFill>
+              <a:schemeClr val="accent1"/>
+            </a:solidFill>
+          </a:ln>
+        </p:spPr>
+        <p:txBody>
+          <a:bodyPr wrap="square" rtlCol="0">
+            <a:spAutoFit/>
+          </a:bodyPr>
+          <a:lstStyle/>
+          <a:p>
+            <a:r>
+              <a:rPr lang="de-AT" sz="1400" b="1" dirty="0">
+                <a:solidFill>
+                  <a:schemeClr val="accent1"/>
+                </a:solidFill>
+              </a:rPr>
+              <a:t>5</a:t>
+            </a:r>
+            <a:endParaRPr lang="en-AT" b="1" dirty="0">
+              <a:solidFill>
+                <a:schemeClr val="accent1"/>
+              </a:solidFill>
+            </a:endParaRPr>
+          </a:p>
+        </p:txBody>
+      </p:sp>
+      <p:sp>
+        <p:nvSpPr>
+          <p:cNvPr id="24" name="TextBox 23">
+            <a:extLst>
+              <a:ext uri="{FF2B5EF4-FFF2-40B4-BE49-F238E27FC236}">
+                <a16:creationId xmlns:a16="http://schemas.microsoft.com/office/drawing/2014/main" id="{8E1F7DD2-0F8F-4536-88EB-C549901AC8AC}"/>
+              </a:ext>
+            </a:extLst>
+          </p:cNvPr>
+          <p:cNvSpPr txBox="1"/>
+          <p:nvPr/>
+        </p:nvSpPr>
+        <p:spPr>
+          <a:xfrm>
+            <a:off x="11598243" y="6334968"/>
+            <a:ext cx="273972" cy="276999"/>
+          </a:xfrm>
+          <a:prstGeom prst="rect">
+            <a:avLst/>
+          </a:prstGeom>
+          <a:noFill/>
+          <a:ln>
+            <a:solidFill>
+              <a:schemeClr val="accent1"/>
+            </a:solidFill>
+          </a:ln>
+        </p:spPr>
+        <p:txBody>
+          <a:bodyPr wrap="square" rtlCol="0">
+            <a:spAutoFit/>
+          </a:bodyPr>
+          <a:lstStyle/>
+          <a:p>
+            <a:r>
+              <a:rPr lang="de-AT" sz="1200" b="1" dirty="0">
+                <a:solidFill>
+                  <a:schemeClr val="accent1"/>
+                </a:solidFill>
+              </a:rPr>
+              <a:t>6</a:t>
+            </a:r>
+            <a:endParaRPr lang="en-AT" sz="1200" b="1" dirty="0">
+              <a:solidFill>
+                <a:schemeClr val="accent1"/>
+              </a:solidFill>
+            </a:endParaRPr>
           </a:p>
         </p:txBody>
       </p:sp>
@@ -6510,6 +6983,24 @@
 </file>
 
 <file path=customXml/item1.xml><?xml version="1.0" encoding="utf-8"?>
+<p:properties xmlns:p="http://schemas.microsoft.com/office/2006/metadata/properties" xmlns:xsi="http://www.w3.org/2001/XMLSchema-instance" xmlns:pc="http://schemas.microsoft.com/office/infopath/2007/PartnerControls">
+  <documentManagement>
+    <Status xmlns="71af3243-3dd4-4a8d-8c0d-dd76da1f02a5">Not started</Status>
+    <MediaServiceKeyPoints xmlns="71af3243-3dd4-4a8d-8c0d-dd76da1f02a5" xsi:nil="true"/>
+  </documentManagement>
+</p:properties>
+</file>
+
+<file path=customXml/item2.xml><?xml version="1.0" encoding="utf-8"?>
+<?mso-contentType ?>
+<FormTemplates xmlns="http://schemas.microsoft.com/sharepoint/v3/contenttype/forms">
+  <Display>DocumentLibraryForm</Display>
+  <Edit>DocumentLibraryForm</Edit>
+  <New>DocumentLibraryForm</New>
+</FormTemplates>
+</file>
+
+<file path=customXml/item3.xml><?xml version="1.0" encoding="utf-8"?>
 <ct:contentTypeSchema xmlns:ct="http://schemas.microsoft.com/office/2006/metadata/contentType" xmlns:ma="http://schemas.microsoft.com/office/2006/metadata/properties/metaAttributes" ct:_="" ma:_="" ma:contentTypeName="Document" ma:contentTypeID="0x01010079F111ED35F8CC479449609E8A0923A6" ma:contentTypeVersion="12" ma:contentTypeDescription="Create a new document." ma:contentTypeScope="" ma:versionID="426e97fa315356fffbdcd9876fe988c2">
   <xsd:schema xmlns:xsd="http://www.w3.org/2001/XMLSchema" xmlns:xs="http://www.w3.org/2001/XMLSchema" xmlns:p="http://schemas.microsoft.com/office/2006/metadata/properties" xmlns:ns2="71af3243-3dd4-4a8d-8c0d-dd76da1f02a5" xmlns:ns3="16c05727-aa75-4e4a-9b5f-8a80a1165891" targetNamespace="http://schemas.microsoft.com/office/2006/metadata/properties" ma:root="true" ma:fieldsID="14b8f0def80e6d70ce3def20c90759ae" ns2:_="" ns3:_="">
     <xsd:import namespace="71af3243-3dd4-4a8d-8c0d-dd76da1f02a5"/>
@@ -6730,25 +7221,32 @@
 </ct:contentTypeSchema>
 </file>
 
-<file path=customXml/item2.xml><?xml version="1.0" encoding="utf-8"?>
-<?mso-contentType ?>
-<FormTemplates xmlns="http://schemas.microsoft.com/sharepoint/v3/contenttype/forms">
-  <Display>DocumentLibraryForm</Display>
-  <Edit>DocumentLibraryForm</Edit>
-  <New>DocumentLibraryForm</New>
-</FormTemplates>
+<file path=customXml/itemProps1.xml><?xml version="1.0" encoding="utf-8"?>
+<ds:datastoreItem xmlns:ds="http://schemas.openxmlformats.org/officeDocument/2006/customXml" ds:itemID="{84F503EC-3FFF-4193-A86F-39150E2BAC75}">
+  <ds:schemaRefs>
+    <ds:schemaRef ds:uri="71af3243-3dd4-4a8d-8c0d-dd76da1f02a5"/>
+    <ds:schemaRef ds:uri="http://purl.org/dc/elements/1.1/"/>
+    <ds:schemaRef ds:uri="http://www.w3.org/XML/1998/namespace"/>
+    <ds:schemaRef ds:uri="http://purl.org/dc/terms/"/>
+    <ds:schemaRef ds:uri="http://schemas.microsoft.com/office/2006/metadata/properties"/>
+    <ds:schemaRef ds:uri="http://schemas.microsoft.com/office/2006/documentManagement/types"/>
+    <ds:schemaRef ds:uri="http://schemas.microsoft.com/office/infopath/2007/PartnerControls"/>
+    <ds:schemaRef ds:uri="http://schemas.openxmlformats.org/package/2006/metadata/core-properties"/>
+    <ds:schemaRef ds:uri="16c05727-aa75-4e4a-9b5f-8a80a1165891"/>
+    <ds:schemaRef ds:uri="http://purl.org/dc/dcmitype/"/>
+  </ds:schemaRefs>
+</ds:datastoreItem>
 </file>
 
-<file path=customXml/item3.xml><?xml version="1.0" encoding="utf-8"?>
-<p:properties xmlns:p="http://schemas.microsoft.com/office/2006/metadata/properties" xmlns:xsi="http://www.w3.org/2001/XMLSchema-instance" xmlns:pc="http://schemas.microsoft.com/office/infopath/2007/PartnerControls">
-  <documentManagement>
-    <Status xmlns="71af3243-3dd4-4a8d-8c0d-dd76da1f02a5">Not started</Status>
-    <MediaServiceKeyPoints xmlns="71af3243-3dd4-4a8d-8c0d-dd76da1f02a5" xsi:nil="true"/>
-  </documentManagement>
-</p:properties>
+<file path=customXml/itemProps2.xml><?xml version="1.0" encoding="utf-8"?>
+<ds:datastoreItem xmlns:ds="http://schemas.openxmlformats.org/officeDocument/2006/customXml" ds:itemID="{2E5ECA37-C458-4BA2-A090-D7A19E07B434}">
+  <ds:schemaRefs>
+    <ds:schemaRef ds:uri="http://schemas.microsoft.com/sharepoint/v3/contenttype/forms"/>
+  </ds:schemaRefs>
+</ds:datastoreItem>
 </file>
 
-<file path=customXml/itemProps1.xml><?xml version="1.0" encoding="utf-8"?>
+<file path=customXml/itemProps3.xml><?xml version="1.0" encoding="utf-8"?>
 <ds:datastoreItem xmlns:ds="http://schemas.openxmlformats.org/officeDocument/2006/customXml" ds:itemID="{7A26AAF5-6CFC-4C52-B7DF-08410EDE6701}">
   <ds:schemaRefs>
     <ds:schemaRef ds:uri="http://schemas.microsoft.com/office/2006/metadata/contentType"/>
@@ -6765,29 +7263,4 @@
     <ds:schemaRef ds:uri="http://schemas.microsoft.com/internal/obd"/>
   </ds:schemaRefs>
 </ds:datastoreItem>
-</file>
-
-<file path=customXml/itemProps2.xml><?xml version="1.0" encoding="utf-8"?>
-<ds:datastoreItem xmlns:ds="http://schemas.openxmlformats.org/officeDocument/2006/customXml" ds:itemID="{2E5ECA37-C458-4BA2-A090-D7A19E07B434}">
-  <ds:schemaRefs>
-    <ds:schemaRef ds:uri="http://schemas.microsoft.com/sharepoint/v3/contenttype/forms"/>
-  </ds:schemaRefs>
-</ds:datastoreItem>
-</file>
-
-<file path=customXml/itemProps3.xml><?xml version="1.0" encoding="utf-8"?>
-<ds:datastoreItem xmlns:ds="http://schemas.openxmlformats.org/officeDocument/2006/customXml" ds:itemID="{84F503EC-3FFF-4193-A86F-39150E2BAC75}">
-  <ds:schemaRefs>
-    <ds:schemaRef ds:uri="71af3243-3dd4-4a8d-8c0d-dd76da1f02a5"/>
-    <ds:schemaRef ds:uri="http://purl.org/dc/elements/1.1/"/>
-    <ds:schemaRef ds:uri="http://www.w3.org/XML/1998/namespace"/>
-    <ds:schemaRef ds:uri="http://purl.org/dc/terms/"/>
-    <ds:schemaRef ds:uri="http://schemas.microsoft.com/office/2006/metadata/properties"/>
-    <ds:schemaRef ds:uri="http://schemas.microsoft.com/office/2006/documentManagement/types"/>
-    <ds:schemaRef ds:uri="http://schemas.microsoft.com/office/infopath/2007/PartnerControls"/>
-    <ds:schemaRef ds:uri="http://schemas.openxmlformats.org/package/2006/metadata/core-properties"/>
-    <ds:schemaRef ds:uri="16c05727-aa75-4e4a-9b5f-8a80a1165891"/>
-    <ds:schemaRef ds:uri="http://purl.org/dc/dcmitype/"/>
-  </ds:schemaRefs>
-</ds:datastoreItem>
 </file>
</xml_diff>

<commit_message>
Worked on final Abgabe
</commit_message>
<xml_diff>
--- a/Finale_Abgabe/Schiffe_versenken.pptx
+++ b/Finale_Abgabe/Schiffe_versenken.pptx
@@ -366,7 +366,7 @@
           <a:p>
             <a:fld id="{9184DA70-C731-4C70-880D-CCD4705E623C}" type="datetime1">
               <a:rPr lang="en-US" smtClean="0"/>
-              <a:t>11/6/2021</a:t>
+              <a:t>11/7/2021</a:t>
             </a:fld>
             <a:endParaRPr lang="en-US" dirty="0"/>
           </a:p>
@@ -554,7 +554,7 @@
           <a:p>
             <a:fld id="{4BE1D723-8F53-4F53-90B0-1982A396982E}" type="datetime1">
               <a:rPr lang="en-US" smtClean="0"/>
-              <a:t>11/6/2021</a:t>
+              <a:t>11/7/2021</a:t>
             </a:fld>
             <a:endParaRPr lang="en-US" dirty="0"/>
           </a:p>
@@ -927,7 +927,7 @@
           <a:p>
             <a:fld id="{97669AF7-7BEB-44E4-9852-375E34362B5B}" type="datetime1">
               <a:rPr lang="en-US" smtClean="0"/>
-              <a:t>11/6/2021</a:t>
+              <a:t>11/7/2021</a:t>
             </a:fld>
             <a:endParaRPr lang="en-US" dirty="0"/>
           </a:p>
@@ -1182,7 +1182,7 @@
           <a:p>
             <a:fld id="{BAAAC38D-0552-4C82-B593-E6124DFADBE2}" type="datetime1">
               <a:rPr lang="en-US" smtClean="0"/>
-              <a:t>11/6/2021</a:t>
+              <a:t>11/7/2021</a:t>
             </a:fld>
             <a:endParaRPr lang="en-US" dirty="0"/>
           </a:p>
@@ -1579,7 +1579,7 @@
           <a:p>
             <a:fld id="{D9DF0F1C-5577-4ACB-BB62-DF8F3C494C7E}" type="datetime1">
               <a:rPr lang="en-US" smtClean="0"/>
-              <a:t>11/6/2021</a:t>
+              <a:t>11/7/2021</a:t>
             </a:fld>
             <a:endParaRPr lang="en-US" dirty="0"/>
           </a:p>
@@ -1715,7 +1715,7 @@
           <a:p>
             <a:fld id="{1775B394-D9F9-4F0C-B15D-605F45CB9E9F}" type="datetime1">
               <a:rPr lang="en-US" smtClean="0"/>
-              <a:t>11/6/2021</a:t>
+              <a:t>11/7/2021</a:t>
             </a:fld>
             <a:endParaRPr lang="en-US" dirty="0"/>
           </a:p>
@@ -1872,7 +1872,7 @@
           <a:p>
             <a:fld id="{39667345-2558-425A-8533-9BFDBCE15005}" type="datetime1">
               <a:rPr lang="en-US" smtClean="0"/>
-              <a:t>11/6/2021</a:t>
+              <a:t>11/7/2021</a:t>
             </a:fld>
             <a:endParaRPr lang="en-US" dirty="0"/>
           </a:p>
@@ -2201,7 +2201,7 @@
           <a:p>
             <a:fld id="{92BEA474-078D-4E9B-9B14-09A87B19DC46}" type="datetime1">
               <a:rPr lang="en-US" smtClean="0"/>
-              <a:t>11/6/2021</a:t>
+              <a:t>11/7/2021</a:t>
             </a:fld>
             <a:endParaRPr lang="en-US" dirty="0"/>
           </a:p>
@@ -2551,7 +2551,7 @@
           <a:p>
             <a:fld id="{4907D986-8816-4272-A432-0437A28A9828}" type="datetime1">
               <a:rPr lang="en-US" smtClean="0"/>
-              <a:t>11/6/2021</a:t>
+              <a:t>11/7/2021</a:t>
             </a:fld>
             <a:endParaRPr lang="en-US" dirty="0"/>
           </a:p>
@@ -2812,7 +2812,7 @@
           <a:p>
             <a:fld id="{62D6E202-B606-4609-B914-27C9371A1F6D}" type="datetime1">
               <a:rPr lang="en-US" smtClean="0"/>
-              <a:t>11/6/2021</a:t>
+              <a:t>11/7/2021</a:t>
             </a:fld>
             <a:endParaRPr lang="en-US" dirty="0"/>
           </a:p>
@@ -3945,7 +3945,7 @@
         <p:spPr/>
         <p:txBody>
           <a:bodyPr>
-            <a:normAutofit lnSpcReduction="10000"/>
+            <a:normAutofit/>
           </a:bodyPr>
           <a:lstStyle/>
           <a:p>
@@ -3953,130 +3953,87 @@
               <a:buNone/>
             </a:pPr>
             <a:r>
-              <a:rPr lang="de-AT" b="1" dirty="0" err="1"/>
-              <a:t>Storypoints</a:t>
+              <a:rPr lang="de-AT" b="1" dirty="0"/>
+              <a:t>Klassen = 17</a:t>
             </a:r>
             <a:br>
               <a:rPr lang="de-AT" b="1" dirty="0"/>
             </a:br>
             <a:r>
-              <a:rPr lang="de-AT" dirty="0"/>
-              <a:t>Geplant -&gt; 303 (+ 371)</a:t>
-            </a:r>
-            <a:br>
-              <a:rPr lang="de-AT" dirty="0"/>
-            </a:br>
-            <a:r>
-              <a:rPr lang="de-AT" dirty="0"/>
-              <a:t>Erreicht -&gt; 28 + 76 + 0 </a:t>
-            </a:r>
-          </a:p>
-          <a:p>
-            <a:pPr marL="0" indent="0">
-              <a:buNone/>
-            </a:pPr>
-            <a:endParaRPr lang="de-AT" dirty="0"/>
-          </a:p>
-          <a:p>
-            <a:pPr marL="0" indent="0">
-              <a:buNone/>
-            </a:pPr>
+              <a:rPr lang="de-AT" b="1" dirty="0" err="1"/>
+              <a:t>Number</a:t>
+            </a:r>
             <a:r>
               <a:rPr lang="de-AT" b="1" dirty="0"/>
-              <a:t>Dauer Coding</a:t>
+              <a:t> of Methods = 50</a:t>
             </a:r>
             <a:br>
               <a:rPr lang="de-AT" b="1" dirty="0"/>
             </a:br>
             <a:r>
-              <a:rPr lang="de-AT" dirty="0"/>
-              <a:t>20.09 – 7.11</a:t>
+              <a:rPr lang="de-AT" b="1" dirty="0"/>
+              <a:t>Line of Codes = 1468</a:t>
             </a:r>
           </a:p>
           <a:p>
             <a:pPr marL="0" indent="0">
               <a:buNone/>
             </a:pPr>
-            <a:endParaRPr lang="de-AT" dirty="0"/>
+            <a:endParaRPr lang="de-AT" b="1" dirty="0"/>
           </a:p>
           <a:p>
             <a:pPr marL="0" indent="0">
               <a:buNone/>
             </a:pPr>
-            <a:r>
-              <a:rPr lang="de-AT" b="1" dirty="0"/>
-              <a:t>Line of Codes</a:t>
-            </a:r>
+            <a:endParaRPr lang="de-AT" b="1" dirty="0"/>
           </a:p>
           <a:p>
             <a:pPr marL="0" indent="0">
               <a:buNone/>
             </a:pPr>
-            <a:r>
-              <a:rPr lang="de-AT" b="1" dirty="0" err="1"/>
-              <a:t>Cyclomatic</a:t>
-            </a:r>
-            <a:r>
-              <a:rPr lang="de-AT" b="1" dirty="0"/>
-              <a:t> </a:t>
-            </a:r>
-            <a:r>
-              <a:rPr lang="de-AT" b="1" dirty="0" err="1"/>
-              <a:t>Complexity</a:t>
-            </a:r>
             <a:endParaRPr lang="de-AT" b="1" dirty="0"/>
           </a:p>
           <a:p>
             <a:pPr marL="0" indent="0">
               <a:buNone/>
             </a:pPr>
-            <a:r>
-              <a:rPr lang="de-AT" b="1" dirty="0" err="1"/>
-              <a:t>Coupling</a:t>
-            </a:r>
-            <a:r>
-              <a:rPr lang="de-AT" b="1" dirty="0"/>
-              <a:t> </a:t>
-            </a:r>
-            <a:r>
-              <a:rPr lang="de-AT" b="1" dirty="0" err="1"/>
-              <a:t>Between</a:t>
-            </a:r>
-            <a:r>
-              <a:rPr lang="de-AT" b="1" dirty="0"/>
-              <a:t> Objects</a:t>
-            </a:r>
+            <a:endParaRPr lang="de-AT" b="1" dirty="0"/>
           </a:p>
           <a:p>
             <a:pPr marL="0" indent="0">
               <a:buNone/>
             </a:pPr>
-            <a:r>
-              <a:rPr lang="de-AT" b="1" dirty="0" err="1"/>
-              <a:t>Number</a:t>
-            </a:r>
-            <a:r>
-              <a:rPr lang="de-AT" b="1" dirty="0"/>
-              <a:t> of Methods</a:t>
-            </a:r>
+            <a:endParaRPr lang="de-AT" b="1" dirty="0"/>
           </a:p>
           <a:p>
             <a:pPr marL="0" indent="0">
               <a:buNone/>
             </a:pPr>
-            <a:r>
-              <a:rPr lang="de-AT" b="1" dirty="0"/>
-              <a:t>Lack of </a:t>
-            </a:r>
-            <a:r>
-              <a:rPr lang="de-AT" b="1" dirty="0" err="1"/>
-              <a:t>Cohesion</a:t>
-            </a:r>
-            <a:r>
-              <a:rPr lang="de-AT" b="1" dirty="0"/>
-              <a:t> on Methods</a:t>
-            </a:r>
-            <a:endParaRPr lang="de-AT" dirty="0"/>
+            <a:endParaRPr lang="de-AT" b="1" dirty="0"/>
+          </a:p>
+          <a:p>
+            <a:pPr marL="0" indent="0">
+              <a:buNone/>
+            </a:pPr>
+            <a:endParaRPr lang="de-AT" b="1" dirty="0"/>
+          </a:p>
+          <a:p>
+            <a:pPr marL="0" indent="0">
+              <a:buNone/>
+            </a:pPr>
+            <a:endParaRPr lang="de-AT" b="1" dirty="0"/>
+          </a:p>
+          <a:p>
+            <a:pPr marL="0" indent="0">
+              <a:buNone/>
+            </a:pPr>
+            <a:endParaRPr lang="de-AT" b="1" dirty="0"/>
+          </a:p>
+          <a:p>
+            <a:pPr marL="0" indent="0">
+              <a:buNone/>
+            </a:pPr>
+            <a:endParaRPr lang="de-AT" b="1" dirty="0"/>
           </a:p>
           <a:p>
             <a:pPr marL="0" indent="0">
@@ -4086,6 +4043,93 @@
           </a:p>
         </p:txBody>
       </p:sp>
+      <p:pic>
+        <p:nvPicPr>
+          <p:cNvPr id="5" name="Picture 4" descr="Table&#10;&#10;Description automatically generated">
+            <a:extLst>
+              <a:ext uri="{FF2B5EF4-FFF2-40B4-BE49-F238E27FC236}">
+                <a16:creationId xmlns:a16="http://schemas.microsoft.com/office/drawing/2014/main" id="{909C91A6-C61C-4F0A-9D1B-69CE8F10C383}"/>
+              </a:ext>
+            </a:extLst>
+          </p:cNvPr>
+          <p:cNvPicPr>
+            <a:picLocks noChangeAspect="1"/>
+          </p:cNvPicPr>
+          <p:nvPr/>
+        </p:nvPicPr>
+        <p:blipFill rotWithShape="1">
+          <a:blip r:embed="rId2"/>
+          <a:srcRect r="43037"/>
+          <a:stretch/>
+        </p:blipFill>
+        <p:spPr>
+          <a:xfrm>
+            <a:off x="5458983" y="2009526"/>
+            <a:ext cx="5173113" cy="2049014"/>
+          </a:xfrm>
+          <a:prstGeom prst="rect">
+            <a:avLst/>
+          </a:prstGeom>
+        </p:spPr>
+      </p:pic>
+      <p:pic>
+        <p:nvPicPr>
+          <p:cNvPr id="8" name="Picture 7" descr="Table&#10;&#10;Description automatically generated">
+            <a:extLst>
+              <a:ext uri="{FF2B5EF4-FFF2-40B4-BE49-F238E27FC236}">
+                <a16:creationId xmlns:a16="http://schemas.microsoft.com/office/drawing/2014/main" id="{52AE2F0D-2B9C-4746-83DF-4E93D3CF3A0D}"/>
+              </a:ext>
+            </a:extLst>
+          </p:cNvPr>
+          <p:cNvPicPr>
+            <a:picLocks noChangeAspect="1"/>
+          </p:cNvPicPr>
+          <p:nvPr/>
+        </p:nvPicPr>
+        <p:blipFill rotWithShape="1">
+          <a:blip r:embed="rId2"/>
+          <a:srcRect l="56816" r="21741"/>
+          <a:stretch/>
+        </p:blipFill>
+        <p:spPr>
+          <a:xfrm>
+            <a:off x="7663272" y="4058541"/>
+            <a:ext cx="1947230" cy="2049014"/>
+          </a:xfrm>
+          <a:prstGeom prst="rect">
+            <a:avLst/>
+          </a:prstGeom>
+        </p:spPr>
+      </p:pic>
+      <p:pic>
+        <p:nvPicPr>
+          <p:cNvPr id="10" name="Picture 9" descr="Table&#10;&#10;Description automatically generated">
+            <a:extLst>
+              <a:ext uri="{FF2B5EF4-FFF2-40B4-BE49-F238E27FC236}">
+                <a16:creationId xmlns:a16="http://schemas.microsoft.com/office/drawing/2014/main" id="{4F5B95B1-790F-4C14-B880-90551F75BB5F}"/>
+              </a:ext>
+            </a:extLst>
+          </p:cNvPr>
+          <p:cNvPicPr>
+            <a:picLocks noChangeAspect="1"/>
+          </p:cNvPicPr>
+          <p:nvPr/>
+        </p:nvPicPr>
+        <p:blipFill rotWithShape="1">
+          <a:blip r:embed="rId2"/>
+          <a:srcRect l="-12" t="-204" r="75831" b="204"/>
+          <a:stretch/>
+        </p:blipFill>
+        <p:spPr>
+          <a:xfrm>
+            <a:off x="5458983" y="4058541"/>
+            <a:ext cx="2195857" cy="2049014"/>
+          </a:xfrm>
+          <a:prstGeom prst="rect">
+            <a:avLst/>
+          </a:prstGeom>
+        </p:spPr>
+      </p:pic>
     </p:spTree>
     <p:extLst>
       <p:ext uri="{BB962C8B-B14F-4D97-AF65-F5344CB8AC3E}">
@@ -5681,6 +5725,11 @@
             <a:off x="5239280" y="463217"/>
             <a:ext cx="3029590" cy="1471584"/>
           </a:xfrm>
+          <a:ln w="12700">
+            <a:solidFill>
+              <a:schemeClr val="accent1"/>
+            </a:solidFill>
+          </a:ln>
         </p:spPr>
       </p:pic>
       <p:sp>
@@ -5789,6 +5838,11 @@
           <a:prstGeom prst="rect">
             <a:avLst/>
           </a:prstGeom>
+          <a:ln w="12700">
+            <a:solidFill>
+              <a:schemeClr val="accent1"/>
+            </a:solidFill>
+          </a:ln>
         </p:spPr>
       </p:pic>
       <p:pic>
@@ -5819,6 +5873,11 @@
           <a:prstGeom prst="rect">
             <a:avLst/>
           </a:prstGeom>
+          <a:ln w="12700">
+            <a:solidFill>
+              <a:schemeClr val="accent1"/>
+            </a:solidFill>
+          </a:ln>
         </p:spPr>
       </p:pic>
       <p:pic>
@@ -5849,6 +5908,11 @@
           <a:prstGeom prst="rect">
             <a:avLst/>
           </a:prstGeom>
+          <a:ln w="12700">
+            <a:solidFill>
+              <a:schemeClr val="accent1"/>
+            </a:solidFill>
+          </a:ln>
         </p:spPr>
       </p:pic>
     </p:spTree>
@@ -6983,24 +7047,6 @@
 </file>
 
 <file path=customXml/item1.xml><?xml version="1.0" encoding="utf-8"?>
-<p:properties xmlns:p="http://schemas.microsoft.com/office/2006/metadata/properties" xmlns:xsi="http://www.w3.org/2001/XMLSchema-instance" xmlns:pc="http://schemas.microsoft.com/office/infopath/2007/PartnerControls">
-  <documentManagement>
-    <Status xmlns="71af3243-3dd4-4a8d-8c0d-dd76da1f02a5">Not started</Status>
-    <MediaServiceKeyPoints xmlns="71af3243-3dd4-4a8d-8c0d-dd76da1f02a5" xsi:nil="true"/>
-  </documentManagement>
-</p:properties>
-</file>
-
-<file path=customXml/item2.xml><?xml version="1.0" encoding="utf-8"?>
-<?mso-contentType ?>
-<FormTemplates xmlns="http://schemas.microsoft.com/sharepoint/v3/contenttype/forms">
-  <Display>DocumentLibraryForm</Display>
-  <Edit>DocumentLibraryForm</Edit>
-  <New>DocumentLibraryForm</New>
-</FormTemplates>
-</file>
-
-<file path=customXml/item3.xml><?xml version="1.0" encoding="utf-8"?>
 <ct:contentTypeSchema xmlns:ct="http://schemas.microsoft.com/office/2006/metadata/contentType" xmlns:ma="http://schemas.microsoft.com/office/2006/metadata/properties/metaAttributes" ct:_="" ma:_="" ma:contentTypeName="Document" ma:contentTypeID="0x01010079F111ED35F8CC479449609E8A0923A6" ma:contentTypeVersion="12" ma:contentTypeDescription="Create a new document." ma:contentTypeScope="" ma:versionID="426e97fa315356fffbdcd9876fe988c2">
   <xsd:schema xmlns:xsd="http://www.w3.org/2001/XMLSchema" xmlns:xs="http://www.w3.org/2001/XMLSchema" xmlns:p="http://schemas.microsoft.com/office/2006/metadata/properties" xmlns:ns2="71af3243-3dd4-4a8d-8c0d-dd76da1f02a5" xmlns:ns3="16c05727-aa75-4e4a-9b5f-8a80a1165891" targetNamespace="http://schemas.microsoft.com/office/2006/metadata/properties" ma:root="true" ma:fieldsID="14b8f0def80e6d70ce3def20c90759ae" ns2:_="" ns3:_="">
     <xsd:import namespace="71af3243-3dd4-4a8d-8c0d-dd76da1f02a5"/>
@@ -7221,32 +7267,25 @@
 </ct:contentTypeSchema>
 </file>
 
-<file path=customXml/itemProps1.xml><?xml version="1.0" encoding="utf-8"?>
-<ds:datastoreItem xmlns:ds="http://schemas.openxmlformats.org/officeDocument/2006/customXml" ds:itemID="{84F503EC-3FFF-4193-A86F-39150E2BAC75}">
-  <ds:schemaRefs>
-    <ds:schemaRef ds:uri="71af3243-3dd4-4a8d-8c0d-dd76da1f02a5"/>
-    <ds:schemaRef ds:uri="http://purl.org/dc/elements/1.1/"/>
-    <ds:schemaRef ds:uri="http://www.w3.org/XML/1998/namespace"/>
-    <ds:schemaRef ds:uri="http://purl.org/dc/terms/"/>
-    <ds:schemaRef ds:uri="http://schemas.microsoft.com/office/2006/metadata/properties"/>
-    <ds:schemaRef ds:uri="http://schemas.microsoft.com/office/2006/documentManagement/types"/>
-    <ds:schemaRef ds:uri="http://schemas.microsoft.com/office/infopath/2007/PartnerControls"/>
-    <ds:schemaRef ds:uri="http://schemas.openxmlformats.org/package/2006/metadata/core-properties"/>
-    <ds:schemaRef ds:uri="16c05727-aa75-4e4a-9b5f-8a80a1165891"/>
-    <ds:schemaRef ds:uri="http://purl.org/dc/dcmitype/"/>
-  </ds:schemaRefs>
-</ds:datastoreItem>
+<file path=customXml/item2.xml><?xml version="1.0" encoding="utf-8"?>
+<?mso-contentType ?>
+<FormTemplates xmlns="http://schemas.microsoft.com/sharepoint/v3/contenttype/forms">
+  <Display>DocumentLibraryForm</Display>
+  <Edit>DocumentLibraryForm</Edit>
+  <New>DocumentLibraryForm</New>
+</FormTemplates>
 </file>
 
-<file path=customXml/itemProps2.xml><?xml version="1.0" encoding="utf-8"?>
-<ds:datastoreItem xmlns:ds="http://schemas.openxmlformats.org/officeDocument/2006/customXml" ds:itemID="{2E5ECA37-C458-4BA2-A090-D7A19E07B434}">
-  <ds:schemaRefs>
-    <ds:schemaRef ds:uri="http://schemas.microsoft.com/sharepoint/v3/contenttype/forms"/>
-  </ds:schemaRefs>
-</ds:datastoreItem>
+<file path=customXml/item3.xml><?xml version="1.0" encoding="utf-8"?>
+<p:properties xmlns:p="http://schemas.microsoft.com/office/2006/metadata/properties" xmlns:xsi="http://www.w3.org/2001/XMLSchema-instance" xmlns:pc="http://schemas.microsoft.com/office/infopath/2007/PartnerControls">
+  <documentManagement>
+    <Status xmlns="71af3243-3dd4-4a8d-8c0d-dd76da1f02a5">Not started</Status>
+    <MediaServiceKeyPoints xmlns="71af3243-3dd4-4a8d-8c0d-dd76da1f02a5" xsi:nil="true"/>
+  </documentManagement>
+</p:properties>
 </file>
 
-<file path=customXml/itemProps3.xml><?xml version="1.0" encoding="utf-8"?>
+<file path=customXml/itemProps1.xml><?xml version="1.0" encoding="utf-8"?>
 <ds:datastoreItem xmlns:ds="http://schemas.openxmlformats.org/officeDocument/2006/customXml" ds:itemID="{7A26AAF5-6CFC-4C52-B7DF-08410EDE6701}">
   <ds:schemaRefs>
     <ds:schemaRef ds:uri="http://schemas.microsoft.com/office/2006/metadata/contentType"/>
@@ -7263,4 +7302,29 @@
     <ds:schemaRef ds:uri="http://schemas.microsoft.com/internal/obd"/>
   </ds:schemaRefs>
 </ds:datastoreItem>
+</file>
+
+<file path=customXml/itemProps2.xml><?xml version="1.0" encoding="utf-8"?>
+<ds:datastoreItem xmlns:ds="http://schemas.openxmlformats.org/officeDocument/2006/customXml" ds:itemID="{2E5ECA37-C458-4BA2-A090-D7A19E07B434}">
+  <ds:schemaRefs>
+    <ds:schemaRef ds:uri="http://schemas.microsoft.com/sharepoint/v3/contenttype/forms"/>
+  </ds:schemaRefs>
+</ds:datastoreItem>
+</file>
+
+<file path=customXml/itemProps3.xml><?xml version="1.0" encoding="utf-8"?>
+<ds:datastoreItem xmlns:ds="http://schemas.openxmlformats.org/officeDocument/2006/customXml" ds:itemID="{84F503EC-3FFF-4193-A86F-39150E2BAC75}">
+  <ds:schemaRefs>
+    <ds:schemaRef ds:uri="71af3243-3dd4-4a8d-8c0d-dd76da1f02a5"/>
+    <ds:schemaRef ds:uri="http://purl.org/dc/elements/1.1/"/>
+    <ds:schemaRef ds:uri="http://www.w3.org/XML/1998/namespace"/>
+    <ds:schemaRef ds:uri="http://purl.org/dc/terms/"/>
+    <ds:schemaRef ds:uri="http://schemas.microsoft.com/office/2006/metadata/properties"/>
+    <ds:schemaRef ds:uri="http://schemas.microsoft.com/office/2006/documentManagement/types"/>
+    <ds:schemaRef ds:uri="http://schemas.microsoft.com/office/infopath/2007/PartnerControls"/>
+    <ds:schemaRef ds:uri="http://schemas.openxmlformats.org/package/2006/metadata/core-properties"/>
+    <ds:schemaRef ds:uri="16c05727-aa75-4e4a-9b5f-8a80a1165891"/>
+    <ds:schemaRef ds:uri="http://purl.org/dc/dcmitype/"/>
+  </ds:schemaRefs>
+</ds:datastoreItem>
 </file>
</xml_diff>

<commit_message>
Updated screenshots from console
</commit_message>
<xml_diff>
--- a/Finale_Abgabe/Schiffe_versenken.pptx
+++ b/Finale_Abgabe/Schiffe_versenken.pptx
@@ -366,7 +366,7 @@
           <a:p>
             <a:fld id="{9184DA70-C731-4C70-880D-CCD4705E623C}" type="datetime1">
               <a:rPr lang="en-US" smtClean="0"/>
-              <a:t>11/7/2021</a:t>
+              <a:t>11/8/21</a:t>
             </a:fld>
             <a:endParaRPr lang="en-US" dirty="0"/>
           </a:p>
@@ -420,7 +420,7 @@
           <a:p>
             <a:fld id="{3A98EE3D-8CD1-4C3F-BD1C-C98C9596463C}" type="slidenum">
               <a:rPr lang="en-US" smtClean="0"/>
-              <a:t>‹#›</a:t>
+              <a:t>‹Nr.›</a:t>
             </a:fld>
             <a:endParaRPr lang="en-US" dirty="0"/>
           </a:p>
@@ -554,7 +554,7 @@
           <a:p>
             <a:fld id="{4BE1D723-8F53-4F53-90B0-1982A396982E}" type="datetime1">
               <a:rPr lang="en-US" smtClean="0"/>
-              <a:t>11/7/2021</a:t>
+              <a:t>11/8/21</a:t>
             </a:fld>
             <a:endParaRPr lang="en-US" dirty="0"/>
           </a:p>
@@ -608,7 +608,7 @@
           <a:p>
             <a:fld id="{3A98EE3D-8CD1-4C3F-BD1C-C98C9596463C}" type="slidenum">
               <a:rPr lang="en-US" smtClean="0"/>
-              <a:t>‹#›</a:t>
+              <a:t>‹Nr.›</a:t>
             </a:fld>
             <a:endParaRPr lang="en-US" dirty="0"/>
           </a:p>
@@ -927,7 +927,7 @@
           <a:p>
             <a:fld id="{97669AF7-7BEB-44E4-9852-375E34362B5B}" type="datetime1">
               <a:rPr lang="en-US" smtClean="0"/>
-              <a:t>11/7/2021</a:t>
+              <a:t>11/8/21</a:t>
             </a:fld>
             <a:endParaRPr lang="en-US" dirty="0"/>
           </a:p>
@@ -981,7 +981,7 @@
           <a:p>
             <a:fld id="{3A98EE3D-8CD1-4C3F-BD1C-C98C9596463C}" type="slidenum">
               <a:rPr lang="en-US" smtClean="0"/>
-              <a:t>‹#›</a:t>
+              <a:t>‹Nr.›</a:t>
             </a:fld>
             <a:endParaRPr lang="en-US" dirty="0"/>
           </a:p>
@@ -1182,7 +1182,7 @@
           <a:p>
             <a:fld id="{BAAAC38D-0552-4C82-B593-E6124DFADBE2}" type="datetime1">
               <a:rPr lang="en-US" smtClean="0"/>
-              <a:t>11/7/2021</a:t>
+              <a:t>11/8/21</a:t>
             </a:fld>
             <a:endParaRPr lang="en-US" dirty="0"/>
           </a:p>
@@ -1236,7 +1236,7 @@
           <a:p>
             <a:fld id="{3A98EE3D-8CD1-4C3F-BD1C-C98C9596463C}" type="slidenum">
               <a:rPr lang="en-US" smtClean="0"/>
-              <a:t>‹#›</a:t>
+              <a:t>‹Nr.›</a:t>
             </a:fld>
             <a:endParaRPr lang="en-US" dirty="0"/>
           </a:p>
@@ -1579,7 +1579,7 @@
           <a:p>
             <a:fld id="{D9DF0F1C-5577-4ACB-BB62-DF8F3C494C7E}" type="datetime1">
               <a:rPr lang="en-US" smtClean="0"/>
-              <a:t>11/7/2021</a:t>
+              <a:t>11/8/21</a:t>
             </a:fld>
             <a:endParaRPr lang="en-US" dirty="0"/>
           </a:p>
@@ -1633,7 +1633,7 @@
           <a:p>
             <a:fld id="{3A98EE3D-8CD1-4C3F-BD1C-C98C9596463C}" type="slidenum">
               <a:rPr lang="en-US" smtClean="0"/>
-              <a:t>‹#›</a:t>
+              <a:t>‹Nr.›</a:t>
             </a:fld>
             <a:endParaRPr lang="en-US" dirty="0"/>
           </a:p>
@@ -1715,7 +1715,7 @@
           <a:p>
             <a:fld id="{1775B394-D9F9-4F0C-B15D-605F45CB9E9F}" type="datetime1">
               <a:rPr lang="en-US" smtClean="0"/>
-              <a:t>11/7/2021</a:t>
+              <a:t>11/8/21</a:t>
             </a:fld>
             <a:endParaRPr lang="en-US" dirty="0"/>
           </a:p>
@@ -1769,7 +1769,7 @@
           <a:p>
             <a:fld id="{3A98EE3D-8CD1-4C3F-BD1C-C98C9596463C}" type="slidenum">
               <a:rPr lang="en-US" smtClean="0"/>
-              <a:t>‹#›</a:t>
+              <a:t>‹Nr.›</a:t>
             </a:fld>
             <a:endParaRPr lang="en-US" dirty="0"/>
           </a:p>
@@ -1872,7 +1872,7 @@
           <a:p>
             <a:fld id="{39667345-2558-425A-8533-9BFDBCE15005}" type="datetime1">
               <a:rPr lang="en-US" smtClean="0"/>
-              <a:t>11/7/2021</a:t>
+              <a:t>11/8/21</a:t>
             </a:fld>
             <a:endParaRPr lang="en-US" dirty="0"/>
           </a:p>
@@ -1926,7 +1926,7 @@
           <a:p>
             <a:fld id="{3A98EE3D-8CD1-4C3F-BD1C-C98C9596463C}" type="slidenum">
               <a:rPr lang="en-US" smtClean="0"/>
-              <a:t>‹#›</a:t>
+              <a:t>‹Nr.›</a:t>
             </a:fld>
             <a:endParaRPr lang="en-US" dirty="0"/>
           </a:p>
@@ -2201,7 +2201,7 @@
           <a:p>
             <a:fld id="{92BEA474-078D-4E9B-9B14-09A87B19DC46}" type="datetime1">
               <a:rPr lang="en-US" smtClean="0"/>
-              <a:t>11/7/2021</a:t>
+              <a:t>11/8/21</a:t>
             </a:fld>
             <a:endParaRPr lang="en-US" dirty="0"/>
           </a:p>
@@ -2265,7 +2265,7 @@
             <a:fld id="{3A98EE3D-8CD1-4C3F-BD1C-C98C9596463C}" type="slidenum">
               <a:rPr lang="en-US" smtClean="0"/>
               <a:pPr/>
-              <a:t>‹#›</a:t>
+              <a:t>‹Nr.›</a:t>
             </a:fld>
             <a:endParaRPr lang="en-US" dirty="0"/>
           </a:p>
@@ -2551,7 +2551,7 @@
           <a:p>
             <a:fld id="{4907D986-8816-4272-A432-0437A28A9828}" type="datetime1">
               <a:rPr lang="en-US" smtClean="0"/>
-              <a:t>11/7/2021</a:t>
+              <a:t>11/8/21</a:t>
             </a:fld>
             <a:endParaRPr lang="en-US" dirty="0"/>
           </a:p>
@@ -2599,7 +2599,7 @@
           <a:p>
             <a:fld id="{3A98EE3D-8CD1-4C3F-BD1C-C98C9596463C}" type="slidenum">
               <a:rPr lang="en-US" smtClean="0"/>
-              <a:t>‹#›</a:t>
+              <a:t>‹Nr.›</a:t>
             </a:fld>
             <a:endParaRPr lang="en-US" dirty="0"/>
           </a:p>
@@ -2812,7 +2812,7 @@
           <a:p>
             <a:fld id="{62D6E202-B606-4609-B914-27C9371A1F6D}" type="datetime1">
               <a:rPr lang="en-US" smtClean="0"/>
-              <a:t>11/7/2021</a:t>
+              <a:t>11/8/21</a:t>
             </a:fld>
             <a:endParaRPr lang="en-US" dirty="0"/>
           </a:p>
@@ -2886,7 +2886,7 @@
           <a:p>
             <a:fld id="{3A98EE3D-8CD1-4C3F-BD1C-C98C9596463C}" type="slidenum">
               <a:rPr lang="en-US" smtClean="0"/>
-              <a:t>‹#›</a:t>
+              <a:t>‹Nr.›</a:t>
             </a:fld>
             <a:endParaRPr lang="en-US" dirty="0"/>
           </a:p>
@@ -6087,6 +6087,180 @@
           <a:chExt cx="0" cy="0"/>
         </a:xfrm>
       </p:grpSpPr>
+      <p:pic>
+        <p:nvPicPr>
+          <p:cNvPr id="27" name="Grafik 26" descr="Ein Bild, das Text enthält.&#10;&#10;Automatisch generierte Beschreibung">
+            <a:extLst>
+              <a:ext uri="{FF2B5EF4-FFF2-40B4-BE49-F238E27FC236}">
+                <a16:creationId xmlns:a16="http://schemas.microsoft.com/office/drawing/2014/main" id="{28DE8AC9-DBA9-594F-BD4C-B46D353F4533}"/>
+              </a:ext>
+            </a:extLst>
+          </p:cNvPr>
+          <p:cNvPicPr>
+            <a:picLocks noChangeAspect="1"/>
+          </p:cNvPicPr>
+          <p:nvPr/>
+        </p:nvPicPr>
+        <p:blipFill>
+          <a:blip r:embed="rId2"/>
+          <a:stretch>
+            <a:fillRect/>
+          </a:stretch>
+        </p:blipFill>
+        <p:spPr>
+          <a:xfrm>
+            <a:off x="5991768" y="5819950"/>
+            <a:ext cx="1966537" cy="940927"/>
+          </a:xfrm>
+          <a:prstGeom prst="rect">
+            <a:avLst/>
+          </a:prstGeom>
+          <a:ln w="12700">
+            <a:solidFill>
+              <a:schemeClr val="accent1"/>
+            </a:solidFill>
+          </a:ln>
+        </p:spPr>
+      </p:pic>
+      <p:pic>
+        <p:nvPicPr>
+          <p:cNvPr id="25" name="Grafik 24" descr="Ein Bild, das Tisch enthält.&#10;&#10;Automatisch generierte Beschreibung">
+            <a:extLst>
+              <a:ext uri="{FF2B5EF4-FFF2-40B4-BE49-F238E27FC236}">
+                <a16:creationId xmlns:a16="http://schemas.microsoft.com/office/drawing/2014/main" id="{01025ED9-F154-5940-925C-C55D3797DA6D}"/>
+              </a:ext>
+            </a:extLst>
+          </p:cNvPr>
+          <p:cNvPicPr>
+            <a:picLocks noChangeAspect="1"/>
+          </p:cNvPicPr>
+          <p:nvPr/>
+        </p:nvPicPr>
+        <p:blipFill>
+          <a:blip r:embed="rId3"/>
+          <a:stretch>
+            <a:fillRect/>
+          </a:stretch>
+        </p:blipFill>
+        <p:spPr>
+          <a:xfrm>
+            <a:off x="8030969" y="3163301"/>
+            <a:ext cx="3469866" cy="3607101"/>
+          </a:xfrm>
+          <a:prstGeom prst="rect">
+            <a:avLst/>
+          </a:prstGeom>
+          <a:ln w="12700">
+            <a:solidFill>
+              <a:schemeClr val="accent1"/>
+            </a:solidFill>
+          </a:ln>
+        </p:spPr>
+      </p:pic>
+      <p:pic>
+        <p:nvPicPr>
+          <p:cNvPr id="16" name="Grafik 15" descr="Ein Bild, das Tisch enthält.&#10;&#10;Automatisch generierte Beschreibung">
+            <a:extLst>
+              <a:ext uri="{FF2B5EF4-FFF2-40B4-BE49-F238E27FC236}">
+                <a16:creationId xmlns:a16="http://schemas.microsoft.com/office/drawing/2014/main" id="{9438A9F2-33D7-1E43-9C59-9DA7F6C2599D}"/>
+              </a:ext>
+            </a:extLst>
+          </p:cNvPr>
+          <p:cNvPicPr>
+            <a:picLocks noChangeAspect="1"/>
+          </p:cNvPicPr>
+          <p:nvPr/>
+        </p:nvPicPr>
+        <p:blipFill>
+          <a:blip r:embed="rId4"/>
+          <a:stretch>
+            <a:fillRect/>
+          </a:stretch>
+        </p:blipFill>
+        <p:spPr>
+          <a:xfrm>
+            <a:off x="5063234" y="2782556"/>
+            <a:ext cx="2895071" cy="2971762"/>
+          </a:xfrm>
+          <a:prstGeom prst="rect">
+            <a:avLst/>
+          </a:prstGeom>
+          <a:ln w="12700">
+            <a:solidFill>
+              <a:schemeClr val="accent1"/>
+            </a:solidFill>
+          </a:ln>
+        </p:spPr>
+      </p:pic>
+      <p:pic>
+        <p:nvPicPr>
+          <p:cNvPr id="12" name="Grafik 11" descr="Ein Bild, das Text enthält.&#10;&#10;Automatisch generierte Beschreibung">
+            <a:extLst>
+              <a:ext uri="{FF2B5EF4-FFF2-40B4-BE49-F238E27FC236}">
+                <a16:creationId xmlns:a16="http://schemas.microsoft.com/office/drawing/2014/main" id="{66158F18-C805-1C4D-AD19-A924BC12FF45}"/>
+              </a:ext>
+            </a:extLst>
+          </p:cNvPr>
+          <p:cNvPicPr>
+            <a:picLocks noChangeAspect="1"/>
+          </p:cNvPicPr>
+          <p:nvPr/>
+        </p:nvPicPr>
+        <p:blipFill rotWithShape="1">
+          <a:blip r:embed="rId5"/>
+          <a:srcRect r="19143"/>
+          <a:stretch/>
+        </p:blipFill>
+        <p:spPr>
+          <a:xfrm>
+            <a:off x="5064090" y="1402332"/>
+            <a:ext cx="2475069" cy="1314592"/>
+          </a:xfrm>
+          <a:prstGeom prst="rect">
+            <a:avLst/>
+          </a:prstGeom>
+          <a:ln w="12700">
+            <a:solidFill>
+              <a:schemeClr val="accent1"/>
+            </a:solidFill>
+          </a:ln>
+        </p:spPr>
+      </p:pic>
+      <p:pic>
+        <p:nvPicPr>
+          <p:cNvPr id="4" name="Grafik 3">
+            <a:extLst>
+              <a:ext uri="{FF2B5EF4-FFF2-40B4-BE49-F238E27FC236}">
+                <a16:creationId xmlns:a16="http://schemas.microsoft.com/office/drawing/2014/main" id="{4765BB8D-DA69-654E-AA53-5B72D6A3866A}"/>
+              </a:ext>
+            </a:extLst>
+          </p:cNvPr>
+          <p:cNvPicPr>
+            <a:picLocks noChangeAspect="1"/>
+          </p:cNvPicPr>
+          <p:nvPr/>
+        </p:nvPicPr>
+        <p:blipFill>
+          <a:blip r:embed="rId6"/>
+          <a:stretch>
+            <a:fillRect/>
+          </a:stretch>
+        </p:blipFill>
+        <p:spPr>
+          <a:xfrm>
+            <a:off x="5064090" y="786383"/>
+            <a:ext cx="2895071" cy="550317"/>
+          </a:xfrm>
+          <a:prstGeom prst="rect">
+            <a:avLst/>
+          </a:prstGeom>
+          <a:ln w="12700">
+            <a:solidFill>
+              <a:schemeClr val="accent1"/>
+            </a:solidFill>
+          </a:ln>
+        </p:spPr>
+      </p:pic>
       <p:sp>
         <p:nvSpPr>
           <p:cNvPr id="2" name="Title 1">
@@ -6214,14 +6388,14 @@
           <p:nvPr/>
         </p:nvPicPr>
         <p:blipFill rotWithShape="1">
-          <a:blip r:embed="rId2"/>
-          <a:srcRect r="32132" b="12277"/>
+          <a:blip r:embed="rId7"/>
+          <a:srcRect t="4347" r="32132" b="12277"/>
           <a:stretch/>
         </p:blipFill>
         <p:spPr>
           <a:xfrm>
-            <a:off x="7896745" y="786383"/>
-            <a:ext cx="3975470" cy="2496620"/>
+            <a:off x="8030969" y="792888"/>
+            <a:ext cx="3841246" cy="2292767"/>
           </a:xfrm>
           <a:prstGeom prst="rect">
             <a:avLst/>
@@ -6233,180 +6407,6 @@
           </a:ln>
         </p:spPr>
       </p:pic>
-      <p:pic>
-        <p:nvPicPr>
-          <p:cNvPr id="7" name="Picture 6" descr="Calendar&#10;&#10;Description automatically generated">
-            <a:extLst>
-              <a:ext uri="{FF2B5EF4-FFF2-40B4-BE49-F238E27FC236}">
-                <a16:creationId xmlns:a16="http://schemas.microsoft.com/office/drawing/2014/main" id="{64E3AD6F-3053-4881-98C6-8D61656B0746}"/>
-              </a:ext>
-            </a:extLst>
-          </p:cNvPr>
-          <p:cNvPicPr>
-            <a:picLocks noChangeAspect="1"/>
-          </p:cNvPicPr>
-          <p:nvPr/>
-        </p:nvPicPr>
-        <p:blipFill>
-          <a:blip r:embed="rId3"/>
-          <a:stretch>
-            <a:fillRect/>
-          </a:stretch>
-        </p:blipFill>
-        <p:spPr>
-          <a:xfrm>
-            <a:off x="5064090" y="1693916"/>
-            <a:ext cx="2751585" cy="2372883"/>
-          </a:xfrm>
-          <a:prstGeom prst="rect">
-            <a:avLst/>
-          </a:prstGeom>
-          <a:ln w="12700">
-            <a:solidFill>
-              <a:schemeClr val="accent1"/>
-            </a:solidFill>
-          </a:ln>
-        </p:spPr>
-      </p:pic>
-      <p:pic>
-        <p:nvPicPr>
-          <p:cNvPr id="10" name="Picture 9" descr="Calendar&#10;&#10;Description automatically generated">
-            <a:extLst>
-              <a:ext uri="{FF2B5EF4-FFF2-40B4-BE49-F238E27FC236}">
-                <a16:creationId xmlns:a16="http://schemas.microsoft.com/office/drawing/2014/main" id="{F609FF0E-52C5-44A3-950F-A75A59681238}"/>
-              </a:ext>
-            </a:extLst>
-          </p:cNvPr>
-          <p:cNvPicPr>
-            <a:picLocks noChangeAspect="1"/>
-          </p:cNvPicPr>
-          <p:nvPr/>
-        </p:nvPicPr>
-        <p:blipFill>
-          <a:blip r:embed="rId4"/>
-          <a:stretch>
-            <a:fillRect/>
-          </a:stretch>
-        </p:blipFill>
-        <p:spPr>
-          <a:xfrm>
-            <a:off x="5074292" y="4194052"/>
-            <a:ext cx="2741383" cy="2608811"/>
-          </a:xfrm>
-          <a:prstGeom prst="rect">
-            <a:avLst/>
-          </a:prstGeom>
-          <a:ln w="12700">
-            <a:solidFill>
-              <a:schemeClr val="accent1"/>
-            </a:solidFill>
-          </a:ln>
-        </p:spPr>
-      </p:pic>
-      <p:pic>
-        <p:nvPicPr>
-          <p:cNvPr id="13" name="Picture 12" descr="Graphical user interface, text, application&#10;&#10;Description automatically generated">
-            <a:extLst>
-              <a:ext uri="{FF2B5EF4-FFF2-40B4-BE49-F238E27FC236}">
-                <a16:creationId xmlns:a16="http://schemas.microsoft.com/office/drawing/2014/main" id="{29C1AFEE-F3EE-4AA0-9788-8EF2190AACA8}"/>
-              </a:ext>
-            </a:extLst>
-          </p:cNvPr>
-          <p:cNvPicPr>
-            <a:picLocks noChangeAspect="1"/>
-          </p:cNvPicPr>
-          <p:nvPr/>
-        </p:nvPicPr>
-        <p:blipFill>
-          <a:blip r:embed="rId5"/>
-          <a:stretch>
-            <a:fillRect/>
-          </a:stretch>
-        </p:blipFill>
-        <p:spPr>
-          <a:xfrm>
-            <a:off x="5074293" y="385999"/>
-            <a:ext cx="2741383" cy="1103674"/>
-          </a:xfrm>
-          <a:prstGeom prst="rect">
-            <a:avLst/>
-          </a:prstGeom>
-          <a:ln w="12700">
-            <a:solidFill>
-              <a:schemeClr val="accent1"/>
-            </a:solidFill>
-          </a:ln>
-        </p:spPr>
-      </p:pic>
-      <p:pic>
-        <p:nvPicPr>
-          <p:cNvPr id="15" name="Picture 14" descr="Text&#10;&#10;Description automatically generated">
-            <a:extLst>
-              <a:ext uri="{FF2B5EF4-FFF2-40B4-BE49-F238E27FC236}">
-                <a16:creationId xmlns:a16="http://schemas.microsoft.com/office/drawing/2014/main" id="{010EF34B-C840-4A55-AB23-84BF0FD1CD03}"/>
-              </a:ext>
-            </a:extLst>
-          </p:cNvPr>
-          <p:cNvPicPr>
-            <a:picLocks noChangeAspect="1"/>
-          </p:cNvPicPr>
-          <p:nvPr/>
-        </p:nvPicPr>
-        <p:blipFill>
-          <a:blip r:embed="rId6"/>
-          <a:stretch>
-            <a:fillRect/>
-          </a:stretch>
-        </p:blipFill>
-        <p:spPr>
-          <a:xfrm>
-            <a:off x="7893479" y="3712482"/>
-            <a:ext cx="3978736" cy="2124568"/>
-          </a:xfrm>
-          <a:prstGeom prst="rect">
-            <a:avLst/>
-          </a:prstGeom>
-          <a:ln w="12700">
-            <a:solidFill>
-              <a:schemeClr val="accent1"/>
-            </a:solidFill>
-          </a:ln>
-        </p:spPr>
-      </p:pic>
-      <p:pic>
-        <p:nvPicPr>
-          <p:cNvPr id="17" name="Picture 16" descr="Text&#10;&#10;Description automatically generated">
-            <a:extLst>
-              <a:ext uri="{FF2B5EF4-FFF2-40B4-BE49-F238E27FC236}">
-                <a16:creationId xmlns:a16="http://schemas.microsoft.com/office/drawing/2014/main" id="{ED4665F4-6B46-4CB4-A566-6B47C444BF0E}"/>
-              </a:ext>
-            </a:extLst>
-          </p:cNvPr>
-          <p:cNvPicPr>
-            <a:picLocks noChangeAspect="1"/>
-          </p:cNvPicPr>
-          <p:nvPr/>
-        </p:nvPicPr>
-        <p:blipFill rotWithShape="1">
-          <a:blip r:embed="rId7"/>
-          <a:srcRect b="90022"/>
-          <a:stretch/>
-        </p:blipFill>
-        <p:spPr>
-          <a:xfrm>
-            <a:off x="7896745" y="6334968"/>
-            <a:ext cx="3975470" cy="274065"/>
-          </a:xfrm>
-          <a:prstGeom prst="rect">
-            <a:avLst/>
-          </a:prstGeom>
-          <a:ln w="12700">
-            <a:solidFill>
-              <a:schemeClr val="accent1"/>
-            </a:solidFill>
-          </a:ln>
-        </p:spPr>
-      </p:pic>
       <p:sp>
         <p:nvSpPr>
           <p:cNvPr id="18" name="TextBox 17">
@@ -6421,7 +6421,7 @@
         </p:nvSpPr>
         <p:spPr>
           <a:xfrm>
-            <a:off x="7541703" y="385999"/>
+            <a:off x="7545989" y="1031265"/>
             <a:ext cx="273972" cy="307777"/>
           </a:xfrm>
           <a:prstGeom prst="rect">
@@ -6519,7 +6519,7 @@
         </p:nvSpPr>
         <p:spPr>
           <a:xfrm>
-            <a:off x="6302896" y="1693916"/>
+            <a:off x="7265478" y="1399989"/>
             <a:ext cx="273972" cy="307777"/>
           </a:xfrm>
           <a:prstGeom prst="rect">
@@ -6570,7 +6570,7 @@
         </p:nvSpPr>
         <p:spPr>
           <a:xfrm>
-            <a:off x="11598243" y="3704792"/>
+            <a:off x="7691559" y="5206314"/>
             <a:ext cx="273972" cy="276999"/>
           </a:xfrm>
           <a:prstGeom prst="rect">
@@ -6621,7 +6621,7 @@
         </p:nvSpPr>
         <p:spPr>
           <a:xfrm>
-            <a:off x="6302896" y="4186362"/>
+            <a:off x="11226863" y="6151913"/>
             <a:ext cx="273972" cy="307777"/>
           </a:xfrm>
           <a:prstGeom prst="rect">
@@ -6672,7 +6672,7 @@
         </p:nvSpPr>
         <p:spPr>
           <a:xfrm>
-            <a:off x="11598243" y="6334968"/>
+            <a:off x="7680316" y="6151913"/>
             <a:ext cx="273972" cy="276999"/>
           </a:xfrm>
           <a:prstGeom prst="rect">
@@ -7047,6 +7047,15 @@
 </file>
 
 <file path=customXml/item1.xml><?xml version="1.0" encoding="utf-8"?>
+<?mso-contentType ?>
+<FormTemplates xmlns="http://schemas.microsoft.com/sharepoint/v3/contenttype/forms">
+  <Display>DocumentLibraryForm</Display>
+  <Edit>DocumentLibraryForm</Edit>
+  <New>DocumentLibraryForm</New>
+</FormTemplates>
+</file>
+
+<file path=customXml/item2.xml><?xml version="1.0" encoding="utf-8"?>
 <ct:contentTypeSchema xmlns:ct="http://schemas.microsoft.com/office/2006/metadata/contentType" xmlns:ma="http://schemas.microsoft.com/office/2006/metadata/properties/metaAttributes" ct:_="" ma:_="" ma:contentTypeName="Document" ma:contentTypeID="0x01010079F111ED35F8CC479449609E8A0923A6" ma:contentTypeVersion="12" ma:contentTypeDescription="Create a new document." ma:contentTypeScope="" ma:versionID="426e97fa315356fffbdcd9876fe988c2">
   <xsd:schema xmlns:xsd="http://www.w3.org/2001/XMLSchema" xmlns:xs="http://www.w3.org/2001/XMLSchema" xmlns:p="http://schemas.microsoft.com/office/2006/metadata/properties" xmlns:ns2="71af3243-3dd4-4a8d-8c0d-dd76da1f02a5" xmlns:ns3="16c05727-aa75-4e4a-9b5f-8a80a1165891" targetNamespace="http://schemas.microsoft.com/office/2006/metadata/properties" ma:root="true" ma:fieldsID="14b8f0def80e6d70ce3def20c90759ae" ns2:_="" ns3:_="">
     <xsd:import namespace="71af3243-3dd4-4a8d-8c0d-dd76da1f02a5"/>
@@ -7267,15 +7276,6 @@
 </ct:contentTypeSchema>
 </file>
 
-<file path=customXml/item2.xml><?xml version="1.0" encoding="utf-8"?>
-<?mso-contentType ?>
-<FormTemplates xmlns="http://schemas.microsoft.com/sharepoint/v3/contenttype/forms">
-  <Display>DocumentLibraryForm</Display>
-  <Edit>DocumentLibraryForm</Edit>
-  <New>DocumentLibraryForm</New>
-</FormTemplates>
-</file>
-
 <file path=customXml/item3.xml><?xml version="1.0" encoding="utf-8"?>
 <p:properties xmlns:p="http://schemas.microsoft.com/office/2006/metadata/properties" xmlns:xsi="http://www.w3.org/2001/XMLSchema-instance" xmlns:pc="http://schemas.microsoft.com/office/infopath/2007/PartnerControls">
   <documentManagement>
@@ -7286,6 +7286,14 @@
 </file>
 
 <file path=customXml/itemProps1.xml><?xml version="1.0" encoding="utf-8"?>
+<ds:datastoreItem xmlns:ds="http://schemas.openxmlformats.org/officeDocument/2006/customXml" ds:itemID="{2E5ECA37-C458-4BA2-A090-D7A19E07B434}">
+  <ds:schemaRefs>
+    <ds:schemaRef ds:uri="http://schemas.microsoft.com/sharepoint/v3/contenttype/forms"/>
+  </ds:schemaRefs>
+</ds:datastoreItem>
+</file>
+
+<file path=customXml/itemProps2.xml><?xml version="1.0" encoding="utf-8"?>
 <ds:datastoreItem xmlns:ds="http://schemas.openxmlformats.org/officeDocument/2006/customXml" ds:itemID="{7A26AAF5-6CFC-4C52-B7DF-08410EDE6701}">
   <ds:schemaRefs>
     <ds:schemaRef ds:uri="http://schemas.microsoft.com/office/2006/metadata/contentType"/>
@@ -7300,14 +7308,6 @@
     <ds:schemaRef ds:uri="http://purl.org/dc/elements/1.1/"/>
     <ds:schemaRef ds:uri="http://purl.org/dc/terms/"/>
     <ds:schemaRef ds:uri="http://schemas.microsoft.com/internal/obd"/>
-  </ds:schemaRefs>
-</ds:datastoreItem>
-</file>
-
-<file path=customXml/itemProps2.xml><?xml version="1.0" encoding="utf-8"?>
-<ds:datastoreItem xmlns:ds="http://schemas.openxmlformats.org/officeDocument/2006/customXml" ds:itemID="{2E5ECA37-C458-4BA2-A090-D7A19E07B434}">
-  <ds:schemaRefs>
-    <ds:schemaRef ds:uri="http://schemas.microsoft.com/sharepoint/v3/contenttype/forms"/>
   </ds:schemaRefs>
 </ds:datastoreItem>
 </file>

</xml_diff>

<commit_message>
Updated .pptx and merged changes with Adriane's
</commit_message>
<xml_diff>
--- a/Finale_Abgabe/Schiffe_versenken.pptx
+++ b/Finale_Abgabe/Schiffe_versenken.pptx
@@ -6057,6 +6057,110 @@
           </a:fontRef>
         </p:style>
       </p:cxnSp>
+      <p:pic>
+        <p:nvPicPr>
+          <p:cNvPr id="4" name="Picture 3">
+            <a:extLst>
+              <a:ext uri="{FF2B5EF4-FFF2-40B4-BE49-F238E27FC236}">
+                <a16:creationId xmlns:a16="http://schemas.microsoft.com/office/drawing/2014/main" id="{AE81705A-61A3-49EB-A53B-0F76DB2B8AF5}"/>
+              </a:ext>
+            </a:extLst>
+          </p:cNvPr>
+          <p:cNvPicPr>
+            <a:picLocks noChangeAspect="1"/>
+          </p:cNvPicPr>
+          <p:nvPr/>
+        </p:nvPicPr>
+        <p:blipFill rotWithShape="1">
+          <a:blip r:embed="rId2"/>
+          <a:srcRect l="-1" r="-51489"/>
+          <a:stretch/>
+        </p:blipFill>
+        <p:spPr>
+          <a:xfrm>
+            <a:off x="4754871" y="591265"/>
+            <a:ext cx="7053792" cy="5576727"/>
+          </a:xfrm>
+          <a:prstGeom prst="rect">
+            <a:avLst/>
+          </a:prstGeom>
+          <a:ln w="12700">
+            <a:solidFill>
+              <a:schemeClr val="accent1"/>
+            </a:solidFill>
+          </a:ln>
+        </p:spPr>
+      </p:pic>
+      <p:pic>
+        <p:nvPicPr>
+          <p:cNvPr id="6" name="Picture 5">
+            <a:extLst>
+              <a:ext uri="{FF2B5EF4-FFF2-40B4-BE49-F238E27FC236}">
+                <a16:creationId xmlns:a16="http://schemas.microsoft.com/office/drawing/2014/main" id="{B2E61D48-54B4-4F8A-9271-7F41F7E180E2}"/>
+              </a:ext>
+            </a:extLst>
+          </p:cNvPr>
+          <p:cNvPicPr>
+            <a:picLocks noChangeAspect="1"/>
+          </p:cNvPicPr>
+          <p:nvPr/>
+        </p:nvPicPr>
+        <p:blipFill>
+          <a:blip r:embed="rId3"/>
+          <a:stretch>
+            <a:fillRect/>
+          </a:stretch>
+        </p:blipFill>
+        <p:spPr>
+          <a:xfrm>
+            <a:off x="7612511" y="2970726"/>
+            <a:ext cx="4029727" cy="2106807"/>
+          </a:xfrm>
+          <a:prstGeom prst="rect">
+            <a:avLst/>
+          </a:prstGeom>
+          <a:ln w="12700">
+            <a:solidFill>
+              <a:schemeClr val="accent1"/>
+            </a:solidFill>
+          </a:ln>
+        </p:spPr>
+      </p:pic>
+      <p:pic>
+        <p:nvPicPr>
+          <p:cNvPr id="8" name="Picture 7">
+            <a:extLst>
+              <a:ext uri="{FF2B5EF4-FFF2-40B4-BE49-F238E27FC236}">
+                <a16:creationId xmlns:a16="http://schemas.microsoft.com/office/drawing/2014/main" id="{113A62CB-5360-47DC-85F5-501110E62463}"/>
+              </a:ext>
+            </a:extLst>
+          </p:cNvPr>
+          <p:cNvPicPr>
+            <a:picLocks noChangeAspect="1"/>
+          </p:cNvPicPr>
+          <p:nvPr/>
+        </p:nvPicPr>
+        <p:blipFill>
+          <a:blip r:embed="rId4"/>
+          <a:stretch>
+            <a:fillRect/>
+          </a:stretch>
+        </p:blipFill>
+        <p:spPr>
+          <a:xfrm>
+            <a:off x="7612511" y="826878"/>
+            <a:ext cx="4029727" cy="1837785"/>
+          </a:xfrm>
+          <a:prstGeom prst="rect">
+            <a:avLst/>
+          </a:prstGeom>
+          <a:ln w="12700">
+            <a:solidFill>
+              <a:schemeClr val="accent1"/>
+            </a:solidFill>
+          </a:ln>
+        </p:spPr>
+      </p:pic>
     </p:spTree>
     <p:extLst>
       <p:ext uri="{BB962C8B-B14F-4D97-AF65-F5344CB8AC3E}">
@@ -6087,180 +6191,6 @@
           <a:chExt cx="0" cy="0"/>
         </a:xfrm>
       </p:grpSpPr>
-      <p:pic>
-        <p:nvPicPr>
-          <p:cNvPr id="27" name="Grafik 26" descr="Ein Bild, das Text enthält.&#10;&#10;Automatisch generierte Beschreibung">
-            <a:extLst>
-              <a:ext uri="{FF2B5EF4-FFF2-40B4-BE49-F238E27FC236}">
-                <a16:creationId xmlns:a16="http://schemas.microsoft.com/office/drawing/2014/main" id="{28DE8AC9-DBA9-594F-BD4C-B46D353F4533}"/>
-              </a:ext>
-            </a:extLst>
-          </p:cNvPr>
-          <p:cNvPicPr>
-            <a:picLocks noChangeAspect="1"/>
-          </p:cNvPicPr>
-          <p:nvPr/>
-        </p:nvPicPr>
-        <p:blipFill>
-          <a:blip r:embed="rId2"/>
-          <a:stretch>
-            <a:fillRect/>
-          </a:stretch>
-        </p:blipFill>
-        <p:spPr>
-          <a:xfrm>
-            <a:off x="5991768" y="5819950"/>
-            <a:ext cx="1966537" cy="940927"/>
-          </a:xfrm>
-          <a:prstGeom prst="rect">
-            <a:avLst/>
-          </a:prstGeom>
-          <a:ln w="12700">
-            <a:solidFill>
-              <a:schemeClr val="accent1"/>
-            </a:solidFill>
-          </a:ln>
-        </p:spPr>
-      </p:pic>
-      <p:pic>
-        <p:nvPicPr>
-          <p:cNvPr id="25" name="Grafik 24" descr="Ein Bild, das Tisch enthält.&#10;&#10;Automatisch generierte Beschreibung">
-            <a:extLst>
-              <a:ext uri="{FF2B5EF4-FFF2-40B4-BE49-F238E27FC236}">
-                <a16:creationId xmlns:a16="http://schemas.microsoft.com/office/drawing/2014/main" id="{01025ED9-F154-5940-925C-C55D3797DA6D}"/>
-              </a:ext>
-            </a:extLst>
-          </p:cNvPr>
-          <p:cNvPicPr>
-            <a:picLocks noChangeAspect="1"/>
-          </p:cNvPicPr>
-          <p:nvPr/>
-        </p:nvPicPr>
-        <p:blipFill>
-          <a:blip r:embed="rId3"/>
-          <a:stretch>
-            <a:fillRect/>
-          </a:stretch>
-        </p:blipFill>
-        <p:spPr>
-          <a:xfrm>
-            <a:off x="8030969" y="3163301"/>
-            <a:ext cx="3469866" cy="3607101"/>
-          </a:xfrm>
-          <a:prstGeom prst="rect">
-            <a:avLst/>
-          </a:prstGeom>
-          <a:ln w="12700">
-            <a:solidFill>
-              <a:schemeClr val="accent1"/>
-            </a:solidFill>
-          </a:ln>
-        </p:spPr>
-      </p:pic>
-      <p:pic>
-        <p:nvPicPr>
-          <p:cNvPr id="16" name="Grafik 15" descr="Ein Bild, das Tisch enthält.&#10;&#10;Automatisch generierte Beschreibung">
-            <a:extLst>
-              <a:ext uri="{FF2B5EF4-FFF2-40B4-BE49-F238E27FC236}">
-                <a16:creationId xmlns:a16="http://schemas.microsoft.com/office/drawing/2014/main" id="{9438A9F2-33D7-1E43-9C59-9DA7F6C2599D}"/>
-              </a:ext>
-            </a:extLst>
-          </p:cNvPr>
-          <p:cNvPicPr>
-            <a:picLocks noChangeAspect="1"/>
-          </p:cNvPicPr>
-          <p:nvPr/>
-        </p:nvPicPr>
-        <p:blipFill>
-          <a:blip r:embed="rId4"/>
-          <a:stretch>
-            <a:fillRect/>
-          </a:stretch>
-        </p:blipFill>
-        <p:spPr>
-          <a:xfrm>
-            <a:off x="5063234" y="2782556"/>
-            <a:ext cx="2895071" cy="2971762"/>
-          </a:xfrm>
-          <a:prstGeom prst="rect">
-            <a:avLst/>
-          </a:prstGeom>
-          <a:ln w="12700">
-            <a:solidFill>
-              <a:schemeClr val="accent1"/>
-            </a:solidFill>
-          </a:ln>
-        </p:spPr>
-      </p:pic>
-      <p:pic>
-        <p:nvPicPr>
-          <p:cNvPr id="12" name="Grafik 11" descr="Ein Bild, das Text enthält.&#10;&#10;Automatisch generierte Beschreibung">
-            <a:extLst>
-              <a:ext uri="{FF2B5EF4-FFF2-40B4-BE49-F238E27FC236}">
-                <a16:creationId xmlns:a16="http://schemas.microsoft.com/office/drawing/2014/main" id="{66158F18-C805-1C4D-AD19-A924BC12FF45}"/>
-              </a:ext>
-            </a:extLst>
-          </p:cNvPr>
-          <p:cNvPicPr>
-            <a:picLocks noChangeAspect="1"/>
-          </p:cNvPicPr>
-          <p:nvPr/>
-        </p:nvPicPr>
-        <p:blipFill rotWithShape="1">
-          <a:blip r:embed="rId5"/>
-          <a:srcRect r="19143"/>
-          <a:stretch/>
-        </p:blipFill>
-        <p:spPr>
-          <a:xfrm>
-            <a:off x="5064090" y="1402332"/>
-            <a:ext cx="2475069" cy="1314592"/>
-          </a:xfrm>
-          <a:prstGeom prst="rect">
-            <a:avLst/>
-          </a:prstGeom>
-          <a:ln w="12700">
-            <a:solidFill>
-              <a:schemeClr val="accent1"/>
-            </a:solidFill>
-          </a:ln>
-        </p:spPr>
-      </p:pic>
-      <p:pic>
-        <p:nvPicPr>
-          <p:cNvPr id="4" name="Grafik 3">
-            <a:extLst>
-              <a:ext uri="{FF2B5EF4-FFF2-40B4-BE49-F238E27FC236}">
-                <a16:creationId xmlns:a16="http://schemas.microsoft.com/office/drawing/2014/main" id="{4765BB8D-DA69-654E-AA53-5B72D6A3866A}"/>
-              </a:ext>
-            </a:extLst>
-          </p:cNvPr>
-          <p:cNvPicPr>
-            <a:picLocks noChangeAspect="1"/>
-          </p:cNvPicPr>
-          <p:nvPr/>
-        </p:nvPicPr>
-        <p:blipFill>
-          <a:blip r:embed="rId6"/>
-          <a:stretch>
-            <a:fillRect/>
-          </a:stretch>
-        </p:blipFill>
-        <p:spPr>
-          <a:xfrm>
-            <a:off x="5064090" y="786383"/>
-            <a:ext cx="2895071" cy="550317"/>
-          </a:xfrm>
-          <a:prstGeom prst="rect">
-            <a:avLst/>
-          </a:prstGeom>
-          <a:ln w="12700">
-            <a:solidFill>
-              <a:schemeClr val="accent1"/>
-            </a:solidFill>
-          </a:ln>
-        </p:spPr>
-      </p:pic>
       <p:sp>
         <p:nvSpPr>
           <p:cNvPr id="2" name="Title 1">
@@ -6375,10 +6305,184 @@
       </p:cxnSp>
       <p:pic>
         <p:nvPicPr>
-          <p:cNvPr id="5" name="Picture 4" descr="Graphical user interface, text, application, email&#10;&#10;Description automatically generated">
-            <a:extLst>
-              <a:ext uri="{FF2B5EF4-FFF2-40B4-BE49-F238E27FC236}">
-                <a16:creationId xmlns:a16="http://schemas.microsoft.com/office/drawing/2014/main" id="{BB0E1E00-35CC-45A4-AFC9-0C5CC23A1A9A}"/>
+          <p:cNvPr id="20" name="Grafik 19" descr="Ein Bild, das Text enthält.&#10;&#10;Automatisch generierte Beschreibung">
+            <a:extLst>
+              <a:ext uri="{FF2B5EF4-FFF2-40B4-BE49-F238E27FC236}">
+                <a16:creationId xmlns:a16="http://schemas.microsoft.com/office/drawing/2014/main" id="{DF28E129-C08F-6B45-901E-8AF8D65A5D77}"/>
+              </a:ext>
+            </a:extLst>
+          </p:cNvPr>
+          <p:cNvPicPr>
+            <a:picLocks noChangeAspect="1"/>
+          </p:cNvPicPr>
+          <p:nvPr/>
+        </p:nvPicPr>
+        <p:blipFill>
+          <a:blip r:embed="rId2"/>
+          <a:stretch>
+            <a:fillRect/>
+          </a:stretch>
+        </p:blipFill>
+        <p:spPr>
+          <a:xfrm>
+            <a:off x="4739553" y="5157103"/>
+            <a:ext cx="2895071" cy="1385202"/>
+          </a:xfrm>
+          <a:prstGeom prst="rect">
+            <a:avLst/>
+          </a:prstGeom>
+          <a:ln w="12700">
+            <a:solidFill>
+              <a:schemeClr val="accent1"/>
+            </a:solidFill>
+          </a:ln>
+        </p:spPr>
+      </p:pic>
+      <p:pic>
+        <p:nvPicPr>
+          <p:cNvPr id="25" name="Grafik 24" descr="Ein Bild, das Tisch enthält.&#10;&#10;Automatisch generierte Beschreibung">
+            <a:extLst>
+              <a:ext uri="{FF2B5EF4-FFF2-40B4-BE49-F238E27FC236}">
+                <a16:creationId xmlns:a16="http://schemas.microsoft.com/office/drawing/2014/main" id="{894DDA43-00CF-154C-83DD-7DD4B6C24BD7}"/>
+              </a:ext>
+            </a:extLst>
+          </p:cNvPr>
+          <p:cNvPicPr>
+            <a:picLocks noChangeAspect="1"/>
+          </p:cNvPicPr>
+          <p:nvPr/>
+        </p:nvPicPr>
+        <p:blipFill>
+          <a:blip r:embed="rId3"/>
+          <a:stretch>
+            <a:fillRect/>
+          </a:stretch>
+        </p:blipFill>
+        <p:spPr>
+          <a:xfrm>
+            <a:off x="7707287" y="2500453"/>
+            <a:ext cx="3841245" cy="4041851"/>
+          </a:xfrm>
+          <a:prstGeom prst="rect">
+            <a:avLst/>
+          </a:prstGeom>
+          <a:ln w="12700">
+            <a:solidFill>
+              <a:schemeClr val="accent1"/>
+            </a:solidFill>
+          </a:ln>
+        </p:spPr>
+      </p:pic>
+      <p:pic>
+        <p:nvPicPr>
+          <p:cNvPr id="26" name="Grafik 25" descr="Ein Bild, das Tisch enthält.&#10;&#10;Automatisch generierte Beschreibung">
+            <a:extLst>
+              <a:ext uri="{FF2B5EF4-FFF2-40B4-BE49-F238E27FC236}">
+                <a16:creationId xmlns:a16="http://schemas.microsoft.com/office/drawing/2014/main" id="{16DC638A-33EE-6241-A0DA-5F9B5016282E}"/>
+              </a:ext>
+            </a:extLst>
+          </p:cNvPr>
+          <p:cNvPicPr>
+            <a:picLocks noChangeAspect="1"/>
+          </p:cNvPicPr>
+          <p:nvPr/>
+        </p:nvPicPr>
+        <p:blipFill>
+          <a:blip r:embed="rId4"/>
+          <a:stretch>
+            <a:fillRect/>
+          </a:stretch>
+        </p:blipFill>
+        <p:spPr>
+          <a:xfrm>
+            <a:off x="4739553" y="2119709"/>
+            <a:ext cx="2895071" cy="2971762"/>
+          </a:xfrm>
+          <a:prstGeom prst="rect">
+            <a:avLst/>
+          </a:prstGeom>
+          <a:ln w="12700">
+            <a:solidFill>
+              <a:schemeClr val="accent1"/>
+            </a:solidFill>
+          </a:ln>
+        </p:spPr>
+      </p:pic>
+      <p:pic>
+        <p:nvPicPr>
+          <p:cNvPr id="27" name="Grafik 26" descr="Ein Bild, das Text enthält.&#10;&#10;Automatisch generierte Beschreibung">
+            <a:extLst>
+              <a:ext uri="{FF2B5EF4-FFF2-40B4-BE49-F238E27FC236}">
+                <a16:creationId xmlns:a16="http://schemas.microsoft.com/office/drawing/2014/main" id="{84400D22-3DE9-7540-806D-61817F39A097}"/>
+              </a:ext>
+            </a:extLst>
+          </p:cNvPr>
+          <p:cNvPicPr>
+            <a:picLocks noChangeAspect="1"/>
+          </p:cNvPicPr>
+          <p:nvPr/>
+        </p:nvPicPr>
+        <p:blipFill rotWithShape="1">
+          <a:blip r:embed="rId5"/>
+          <a:srcRect r="19143"/>
+          <a:stretch/>
+        </p:blipFill>
+        <p:spPr>
+          <a:xfrm>
+            <a:off x="4740409" y="739485"/>
+            <a:ext cx="2475069" cy="1314592"/>
+          </a:xfrm>
+          <a:prstGeom prst="rect">
+            <a:avLst/>
+          </a:prstGeom>
+          <a:ln w="12700">
+            <a:solidFill>
+              <a:schemeClr val="accent1"/>
+            </a:solidFill>
+          </a:ln>
+        </p:spPr>
+      </p:pic>
+      <p:pic>
+        <p:nvPicPr>
+          <p:cNvPr id="28" name="Grafik 27">
+            <a:extLst>
+              <a:ext uri="{FF2B5EF4-FFF2-40B4-BE49-F238E27FC236}">
+                <a16:creationId xmlns:a16="http://schemas.microsoft.com/office/drawing/2014/main" id="{B676A559-904D-0741-A50C-7A08548A711E}"/>
+              </a:ext>
+            </a:extLst>
+          </p:cNvPr>
+          <p:cNvPicPr>
+            <a:picLocks noChangeAspect="1"/>
+          </p:cNvPicPr>
+          <p:nvPr/>
+        </p:nvPicPr>
+        <p:blipFill>
+          <a:blip r:embed="rId6"/>
+          <a:stretch>
+            <a:fillRect/>
+          </a:stretch>
+        </p:blipFill>
+        <p:spPr>
+          <a:xfrm>
+            <a:off x="4740409" y="123536"/>
+            <a:ext cx="2895071" cy="550317"/>
+          </a:xfrm>
+          <a:prstGeom prst="rect">
+            <a:avLst/>
+          </a:prstGeom>
+          <a:ln w="12700">
+            <a:solidFill>
+              <a:schemeClr val="accent1"/>
+            </a:solidFill>
+          </a:ln>
+        </p:spPr>
+      </p:pic>
+      <p:pic>
+        <p:nvPicPr>
+          <p:cNvPr id="29" name="Picture 4" descr="Graphical user interface, text, application, email&#10;&#10;Description automatically generated">
+            <a:extLst>
+              <a:ext uri="{FF2B5EF4-FFF2-40B4-BE49-F238E27FC236}">
+                <a16:creationId xmlns:a16="http://schemas.microsoft.com/office/drawing/2014/main" id="{62417D95-9230-C842-AA49-EA3C77B23DF3}"/>
               </a:ext>
             </a:extLst>
           </p:cNvPr>
@@ -6394,7 +6498,7 @@
         </p:blipFill>
         <p:spPr>
           <a:xfrm>
-            <a:off x="8030969" y="792888"/>
+            <a:off x="7707288" y="120102"/>
             <a:ext cx="3841246" cy="2292767"/>
           </a:xfrm>
           <a:prstGeom prst="rect">
@@ -6409,10 +6513,10 @@
       </p:pic>
       <p:sp>
         <p:nvSpPr>
-          <p:cNvPr id="18" name="TextBox 17">
-            <a:extLst>
-              <a:ext uri="{FF2B5EF4-FFF2-40B4-BE49-F238E27FC236}">
-                <a16:creationId xmlns:a16="http://schemas.microsoft.com/office/drawing/2014/main" id="{B12AB11F-F442-4016-9231-691DAA966097}"/>
+          <p:cNvPr id="30" name="TextBox 17">
+            <a:extLst>
+              <a:ext uri="{FF2B5EF4-FFF2-40B4-BE49-F238E27FC236}">
+                <a16:creationId xmlns:a16="http://schemas.microsoft.com/office/drawing/2014/main" id="{8383B22F-7B07-4144-AA60-6AF015CDD40E}"/>
               </a:ext>
             </a:extLst>
           </p:cNvPr>
@@ -6421,7 +6525,7 @@
         </p:nvSpPr>
         <p:spPr>
           <a:xfrm>
-            <a:off x="7545989" y="1031265"/>
+            <a:off x="7222308" y="368418"/>
             <a:ext cx="273972" cy="307777"/>
           </a:xfrm>
           <a:prstGeom prst="rect">
@@ -6458,10 +6562,10 @@
       </p:sp>
       <p:sp>
         <p:nvSpPr>
-          <p:cNvPr id="19" name="TextBox 18">
-            <a:extLst>
-              <a:ext uri="{FF2B5EF4-FFF2-40B4-BE49-F238E27FC236}">
-                <a16:creationId xmlns:a16="http://schemas.microsoft.com/office/drawing/2014/main" id="{092020E5-9165-4B77-9829-921351226535}"/>
+          <p:cNvPr id="31" name="TextBox 18">
+            <a:extLst>
+              <a:ext uri="{FF2B5EF4-FFF2-40B4-BE49-F238E27FC236}">
+                <a16:creationId xmlns:a16="http://schemas.microsoft.com/office/drawing/2014/main" id="{60B8C4D5-4A9F-254E-B427-A380F14E2585}"/>
               </a:ext>
             </a:extLst>
           </p:cNvPr>
@@ -6470,7 +6574,7 @@
         </p:nvSpPr>
         <p:spPr>
           <a:xfrm>
-            <a:off x="11598243" y="786383"/>
+            <a:off x="11274562" y="123536"/>
             <a:ext cx="273972" cy="307777"/>
           </a:xfrm>
           <a:prstGeom prst="rect">
@@ -6507,10 +6611,10 @@
       </p:sp>
       <p:sp>
         <p:nvSpPr>
-          <p:cNvPr id="21" name="TextBox 20">
-            <a:extLst>
-              <a:ext uri="{FF2B5EF4-FFF2-40B4-BE49-F238E27FC236}">
-                <a16:creationId xmlns:a16="http://schemas.microsoft.com/office/drawing/2014/main" id="{DA0010FB-FA7C-494C-A4AC-416714C7FB5B}"/>
+          <p:cNvPr id="32" name="TextBox 20">
+            <a:extLst>
+              <a:ext uri="{FF2B5EF4-FFF2-40B4-BE49-F238E27FC236}">
+                <a16:creationId xmlns:a16="http://schemas.microsoft.com/office/drawing/2014/main" id="{0686581D-BEB9-BE42-B9D5-611EFF9F58F2}"/>
               </a:ext>
             </a:extLst>
           </p:cNvPr>
@@ -6519,7 +6623,7 @@
         </p:nvSpPr>
         <p:spPr>
           <a:xfrm>
-            <a:off x="7265478" y="1399989"/>
+            <a:off x="6941797" y="737142"/>
             <a:ext cx="273972" cy="307777"/>
           </a:xfrm>
           <a:prstGeom prst="rect">
@@ -6558,10 +6662,10 @@
       </p:sp>
       <p:sp>
         <p:nvSpPr>
-          <p:cNvPr id="22" name="TextBox 21">
-            <a:extLst>
-              <a:ext uri="{FF2B5EF4-FFF2-40B4-BE49-F238E27FC236}">
-                <a16:creationId xmlns:a16="http://schemas.microsoft.com/office/drawing/2014/main" id="{E1DBD8F7-D88F-4F88-BE41-2F5BE45B4040}"/>
+          <p:cNvPr id="33" name="TextBox 21">
+            <a:extLst>
+              <a:ext uri="{FF2B5EF4-FFF2-40B4-BE49-F238E27FC236}">
+                <a16:creationId xmlns:a16="http://schemas.microsoft.com/office/drawing/2014/main" id="{F21F1C07-788C-9148-B7FD-663E233353B6}"/>
               </a:ext>
             </a:extLst>
           </p:cNvPr>
@@ -6570,7 +6674,7 @@
         </p:nvSpPr>
         <p:spPr>
           <a:xfrm>
-            <a:off x="7691559" y="5206314"/>
+            <a:off x="7357939" y="4543467"/>
             <a:ext cx="273972" cy="276999"/>
           </a:xfrm>
           <a:prstGeom prst="rect">
@@ -6609,10 +6713,10 @@
       </p:sp>
       <p:sp>
         <p:nvSpPr>
-          <p:cNvPr id="23" name="TextBox 22">
-            <a:extLst>
-              <a:ext uri="{FF2B5EF4-FFF2-40B4-BE49-F238E27FC236}">
-                <a16:creationId xmlns:a16="http://schemas.microsoft.com/office/drawing/2014/main" id="{6454E249-D00B-4B21-9FBA-80947471C647}"/>
+          <p:cNvPr id="34" name="TextBox 22">
+            <a:extLst>
+              <a:ext uri="{FF2B5EF4-FFF2-40B4-BE49-F238E27FC236}">
+                <a16:creationId xmlns:a16="http://schemas.microsoft.com/office/drawing/2014/main" id="{39090E7E-7B58-864B-8067-D858C5301E48}"/>
               </a:ext>
             </a:extLst>
           </p:cNvPr>
@@ -6621,7 +6725,7 @@
         </p:nvSpPr>
         <p:spPr>
           <a:xfrm>
-            <a:off x="11226863" y="6151913"/>
+            <a:off x="11274560" y="5799778"/>
             <a:ext cx="273972" cy="307777"/>
           </a:xfrm>
           <a:prstGeom prst="rect">
@@ -6660,10 +6764,10 @@
       </p:sp>
       <p:sp>
         <p:nvSpPr>
-          <p:cNvPr id="24" name="TextBox 23">
-            <a:extLst>
-              <a:ext uri="{FF2B5EF4-FFF2-40B4-BE49-F238E27FC236}">
-                <a16:creationId xmlns:a16="http://schemas.microsoft.com/office/drawing/2014/main" id="{8E1F7DD2-0F8F-4536-88EB-C549901AC8AC}"/>
+          <p:cNvPr id="35" name="TextBox 23">
+            <a:extLst>
+              <a:ext uri="{FF2B5EF4-FFF2-40B4-BE49-F238E27FC236}">
+                <a16:creationId xmlns:a16="http://schemas.microsoft.com/office/drawing/2014/main" id="{6111FFF2-A09E-774E-B42C-5106D9FE6B47}"/>
               </a:ext>
             </a:extLst>
           </p:cNvPr>
@@ -6672,7 +6776,7 @@
         </p:nvSpPr>
         <p:spPr>
           <a:xfrm>
-            <a:off x="7680316" y="6151913"/>
+            <a:off x="7356635" y="5489066"/>
             <a:ext cx="273972" cy="276999"/>
           </a:xfrm>
           <a:prstGeom prst="rect">
@@ -7047,15 +7151,6 @@
 </file>
 
 <file path=customXml/item1.xml><?xml version="1.0" encoding="utf-8"?>
-<?mso-contentType ?>
-<FormTemplates xmlns="http://schemas.microsoft.com/sharepoint/v3/contenttype/forms">
-  <Display>DocumentLibraryForm</Display>
-  <Edit>DocumentLibraryForm</Edit>
-  <New>DocumentLibraryForm</New>
-</FormTemplates>
-</file>
-
-<file path=customXml/item2.xml><?xml version="1.0" encoding="utf-8"?>
 <ct:contentTypeSchema xmlns:ct="http://schemas.microsoft.com/office/2006/metadata/contentType" xmlns:ma="http://schemas.microsoft.com/office/2006/metadata/properties/metaAttributes" ct:_="" ma:_="" ma:contentTypeName="Document" ma:contentTypeID="0x01010079F111ED35F8CC479449609E8A0923A6" ma:contentTypeVersion="12" ma:contentTypeDescription="Create a new document." ma:contentTypeScope="" ma:versionID="426e97fa315356fffbdcd9876fe988c2">
   <xsd:schema xmlns:xsd="http://www.w3.org/2001/XMLSchema" xmlns:xs="http://www.w3.org/2001/XMLSchema" xmlns:p="http://schemas.microsoft.com/office/2006/metadata/properties" xmlns:ns2="71af3243-3dd4-4a8d-8c0d-dd76da1f02a5" xmlns:ns3="16c05727-aa75-4e4a-9b5f-8a80a1165891" targetNamespace="http://schemas.microsoft.com/office/2006/metadata/properties" ma:root="true" ma:fieldsID="14b8f0def80e6d70ce3def20c90759ae" ns2:_="" ns3:_="">
     <xsd:import namespace="71af3243-3dd4-4a8d-8c0d-dd76da1f02a5"/>
@@ -7276,6 +7371,15 @@
 </ct:contentTypeSchema>
 </file>
 
+<file path=customXml/item2.xml><?xml version="1.0" encoding="utf-8"?>
+<?mso-contentType ?>
+<FormTemplates xmlns="http://schemas.microsoft.com/sharepoint/v3/contenttype/forms">
+  <Display>DocumentLibraryForm</Display>
+  <Edit>DocumentLibraryForm</Edit>
+  <New>DocumentLibraryForm</New>
+</FormTemplates>
+</file>
+
 <file path=customXml/item3.xml><?xml version="1.0" encoding="utf-8"?>
 <p:properties xmlns:p="http://schemas.microsoft.com/office/2006/metadata/properties" xmlns:xsi="http://www.w3.org/2001/XMLSchema-instance" xmlns:pc="http://schemas.microsoft.com/office/infopath/2007/PartnerControls">
   <documentManagement>
@@ -7286,14 +7390,6 @@
 </file>
 
 <file path=customXml/itemProps1.xml><?xml version="1.0" encoding="utf-8"?>
-<ds:datastoreItem xmlns:ds="http://schemas.openxmlformats.org/officeDocument/2006/customXml" ds:itemID="{2E5ECA37-C458-4BA2-A090-D7A19E07B434}">
-  <ds:schemaRefs>
-    <ds:schemaRef ds:uri="http://schemas.microsoft.com/sharepoint/v3/contenttype/forms"/>
-  </ds:schemaRefs>
-</ds:datastoreItem>
-</file>
-
-<file path=customXml/itemProps2.xml><?xml version="1.0" encoding="utf-8"?>
 <ds:datastoreItem xmlns:ds="http://schemas.openxmlformats.org/officeDocument/2006/customXml" ds:itemID="{7A26AAF5-6CFC-4C52-B7DF-08410EDE6701}">
   <ds:schemaRefs>
     <ds:schemaRef ds:uri="http://schemas.microsoft.com/office/2006/metadata/contentType"/>
@@ -7308,6 +7404,14 @@
     <ds:schemaRef ds:uri="http://purl.org/dc/elements/1.1/"/>
     <ds:schemaRef ds:uri="http://purl.org/dc/terms/"/>
     <ds:schemaRef ds:uri="http://schemas.microsoft.com/internal/obd"/>
+  </ds:schemaRefs>
+</ds:datastoreItem>
+</file>
+
+<file path=customXml/itemProps2.xml><?xml version="1.0" encoding="utf-8"?>
+<ds:datastoreItem xmlns:ds="http://schemas.openxmlformats.org/officeDocument/2006/customXml" ds:itemID="{2E5ECA37-C458-4BA2-A090-D7A19E07B434}">
+  <ds:schemaRefs>
+    <ds:schemaRef ds:uri="http://schemas.microsoft.com/sharepoint/v3/contenttype/forms"/>
   </ds:schemaRefs>
 </ds:datastoreItem>
 </file>

</xml_diff>